<commit_message>
fixed up ppt presentation
</commit_message>
<xml_diff>
--- a/documents/Spam Filtering.pptx
+++ b/documents/Spam Filtering.pptx
@@ -5,7 +5,7 @@
     <p:sldMasterId id="2147483648" r:id="rId1"/>
   </p:sldMasterIdLst>
   <p:notesMasterIdLst>
-    <p:notesMasterId r:id="rId20"/>
+    <p:notesMasterId r:id="rId19"/>
   </p:notesMasterIdLst>
   <p:sldIdLst>
     <p:sldId id="256" r:id="rId2"/>
@@ -14,18 +14,17 @@
     <p:sldId id="259" r:id="rId5"/>
     <p:sldId id="260" r:id="rId6"/>
     <p:sldId id="261" r:id="rId7"/>
-    <p:sldId id="262" r:id="rId8"/>
-    <p:sldId id="263" r:id="rId9"/>
-    <p:sldId id="264" r:id="rId10"/>
-    <p:sldId id="272" r:id="rId11"/>
-    <p:sldId id="265" r:id="rId12"/>
-    <p:sldId id="266" r:id="rId13"/>
-    <p:sldId id="267" r:id="rId14"/>
-    <p:sldId id="268" r:id="rId15"/>
-    <p:sldId id="273" r:id="rId16"/>
-    <p:sldId id="270" r:id="rId17"/>
-    <p:sldId id="269" r:id="rId18"/>
-    <p:sldId id="271" r:id="rId19"/>
+    <p:sldId id="263" r:id="rId8"/>
+    <p:sldId id="264" r:id="rId9"/>
+    <p:sldId id="272" r:id="rId10"/>
+    <p:sldId id="266" r:id="rId11"/>
+    <p:sldId id="267" r:id="rId12"/>
+    <p:sldId id="268" r:id="rId13"/>
+    <p:sldId id="273" r:id="rId14"/>
+    <p:sldId id="270" r:id="rId15"/>
+    <p:sldId id="269" r:id="rId16"/>
+    <p:sldId id="271" r:id="rId17"/>
+    <p:sldId id="274" r:id="rId18"/>
   </p:sldIdLst>
   <p:sldSz cx="9144000" cy="6858000" type="screen4x3"/>
   <p:notesSz cx="6858000" cy="9144000"/>
@@ -209,7 +208,7 @@
           <a:p>
             <a:fld id="{55643476-2C32-470F-A0C6-B75A3D7C4242}" type="datetimeFigureOut">
               <a:rPr lang="en-US" smtClean="0"/>
-              <a:t>4/23/2014</a:t>
+              <a:t>5/7/2014</a:t>
             </a:fld>
             <a:endParaRPr lang="en-US"/>
           </a:p>
@@ -742,7 +741,7 @@
           <a:p>
             <a:fld id="{ADAE9653-FF61-46B4-B72E-AF0E858EFE8A}" type="datetimeFigureOut">
               <a:rPr lang="en-US" smtClean="0"/>
-              <a:t>4/23/2014</a:t>
+              <a:t>5/7/2014</a:t>
             </a:fld>
             <a:endParaRPr lang="en-US"/>
           </a:p>
@@ -912,7 +911,7 @@
           <a:p>
             <a:fld id="{ADAE9653-FF61-46B4-B72E-AF0E858EFE8A}" type="datetimeFigureOut">
               <a:rPr lang="en-US" smtClean="0"/>
-              <a:t>4/23/2014</a:t>
+              <a:t>5/7/2014</a:t>
             </a:fld>
             <a:endParaRPr lang="en-US"/>
           </a:p>
@@ -1092,7 +1091,7 @@
           <a:p>
             <a:fld id="{ADAE9653-FF61-46B4-B72E-AF0E858EFE8A}" type="datetimeFigureOut">
               <a:rPr lang="en-US" smtClean="0"/>
-              <a:t>4/23/2014</a:t>
+              <a:t>5/7/2014</a:t>
             </a:fld>
             <a:endParaRPr lang="en-US"/>
           </a:p>
@@ -1262,7 +1261,7 @@
           <a:p>
             <a:fld id="{ADAE9653-FF61-46B4-B72E-AF0E858EFE8A}" type="datetimeFigureOut">
               <a:rPr lang="en-US" smtClean="0"/>
-              <a:t>4/23/2014</a:t>
+              <a:t>5/7/2014</a:t>
             </a:fld>
             <a:endParaRPr lang="en-US"/>
           </a:p>
@@ -1508,7 +1507,7 @@
           <a:p>
             <a:fld id="{ADAE9653-FF61-46B4-B72E-AF0E858EFE8A}" type="datetimeFigureOut">
               <a:rPr lang="en-US" smtClean="0"/>
-              <a:t>4/23/2014</a:t>
+              <a:t>5/7/2014</a:t>
             </a:fld>
             <a:endParaRPr lang="en-US"/>
           </a:p>
@@ -1796,7 +1795,7 @@
           <a:p>
             <a:fld id="{ADAE9653-FF61-46B4-B72E-AF0E858EFE8A}" type="datetimeFigureOut">
               <a:rPr lang="en-US" smtClean="0"/>
-              <a:t>4/23/2014</a:t>
+              <a:t>5/7/2014</a:t>
             </a:fld>
             <a:endParaRPr lang="en-US"/>
           </a:p>
@@ -2218,7 +2217,7 @@
           <a:p>
             <a:fld id="{ADAE9653-FF61-46B4-B72E-AF0E858EFE8A}" type="datetimeFigureOut">
               <a:rPr lang="en-US" smtClean="0"/>
-              <a:t>4/23/2014</a:t>
+              <a:t>5/7/2014</a:t>
             </a:fld>
             <a:endParaRPr lang="en-US"/>
           </a:p>
@@ -2336,7 +2335,7 @@
           <a:p>
             <a:fld id="{ADAE9653-FF61-46B4-B72E-AF0E858EFE8A}" type="datetimeFigureOut">
               <a:rPr lang="en-US" smtClean="0"/>
-              <a:t>4/23/2014</a:t>
+              <a:t>5/7/2014</a:t>
             </a:fld>
             <a:endParaRPr lang="en-US"/>
           </a:p>
@@ -2431,7 +2430,7 @@
           <a:p>
             <a:fld id="{ADAE9653-FF61-46B4-B72E-AF0E858EFE8A}" type="datetimeFigureOut">
               <a:rPr lang="en-US" smtClean="0"/>
-              <a:t>4/23/2014</a:t>
+              <a:t>5/7/2014</a:t>
             </a:fld>
             <a:endParaRPr lang="en-US"/>
           </a:p>
@@ -2708,7 +2707,7 @@
           <a:p>
             <a:fld id="{ADAE9653-FF61-46B4-B72E-AF0E858EFE8A}" type="datetimeFigureOut">
               <a:rPr lang="en-US" smtClean="0"/>
-              <a:t>4/23/2014</a:t>
+              <a:t>5/7/2014</a:t>
             </a:fld>
             <a:endParaRPr lang="en-US"/>
           </a:p>
@@ -2961,7 +2960,7 @@
           <a:p>
             <a:fld id="{ADAE9653-FF61-46B4-B72E-AF0E858EFE8A}" type="datetimeFigureOut">
               <a:rPr lang="en-US" smtClean="0"/>
-              <a:t>4/23/2014</a:t>
+              <a:t>5/7/2014</a:t>
             </a:fld>
             <a:endParaRPr lang="en-US"/>
           </a:p>
@@ -3174,7 +3173,7 @@
           <a:p>
             <a:fld id="{ADAE9653-FF61-46B4-B72E-AF0E858EFE8A}" type="datetimeFigureOut">
               <a:rPr lang="en-US" smtClean="0"/>
-              <a:t>4/23/2014</a:t>
+              <a:t>5/7/2014</a:t>
             </a:fld>
             <a:endParaRPr lang="en-US"/>
           </a:p>
@@ -3589,7 +3588,11 @@
           <a:p>
             <a:r>
               <a:rPr lang="en-US" dirty="0" smtClean="0"/>
-              <a:t>Noah Portnoy</a:t>
+              <a:t>Noah </a:t>
+            </a:r>
+            <a:r>
+              <a:rPr lang="en-US" dirty="0" smtClean="0"/>
+              <a:t>Portnoy and Andrew Sousa</a:t>
             </a:r>
             <a:endParaRPr lang="en-US" dirty="0"/>
           </a:p>
@@ -3605,11 +3608,11 @@
   <p:clrMapOvr>
     <a:masterClrMapping/>
   </p:clrMapOvr>
-  <mc:AlternateContent xmlns:mc="http://schemas.openxmlformats.org/markup-compatibility/2006">
-    <mc:Choice xmlns:p14="http://schemas.microsoft.com/office/powerpoint/2010/main" Requires="p14">
+  <mc:AlternateContent xmlns:mc="http://schemas.openxmlformats.org/markup-compatibility/2006" xmlns:p14="http://schemas.microsoft.com/office/powerpoint/2010/main">
+    <mc:Choice Requires="p14">
       <p:transition spd="slow" p14:dur="2000"/>
     </mc:Choice>
-    <mc:Fallback>
+    <mc:Fallback xmlns="">
       <p:transition spd="slow"/>
     </mc:Fallback>
   </mc:AlternateContent>
@@ -3624,879 +3627,6 @@
 </file>
 
 <file path=ppt/slides/slide10.xml><?xml version="1.0" encoding="utf-8"?>
-<p:sld xmlns:a="http://schemas.openxmlformats.org/drawingml/2006/main" xmlns:r="http://schemas.openxmlformats.org/officeDocument/2006/relationships" xmlns:p="http://schemas.openxmlformats.org/presentationml/2006/main">
-  <p:cSld>
-    <p:spTree>
-      <p:nvGrpSpPr>
-        <p:cNvPr id="1" name=""/>
-        <p:cNvGrpSpPr/>
-        <p:nvPr/>
-      </p:nvGrpSpPr>
-      <p:grpSpPr>
-        <a:xfrm>
-          <a:off x="0" y="0"/>
-          <a:ext cx="0" cy="0"/>
-          <a:chOff x="0" y="0"/>
-          <a:chExt cx="0" cy="0"/>
-        </a:xfrm>
-      </p:grpSpPr>
-      <p:sp>
-        <p:nvSpPr>
-          <p:cNvPr id="4" name="Content Placeholder 2"/>
-          <p:cNvSpPr>
-            <a:spLocks noGrp="1"/>
-          </p:cNvSpPr>
-          <p:nvPr>
-            <p:ph idx="1"/>
-          </p:nvPr>
-        </p:nvSpPr>
-        <p:spPr>
-          <a:xfrm>
-            <a:off x="457200" y="3124200"/>
-            <a:ext cx="8229600" cy="609600"/>
-          </a:xfrm>
-        </p:spPr>
-        <p:txBody>
-          <a:bodyPr anchor="t"/>
-          <a:lstStyle/>
-          <a:p>
-            <a:pPr marL="0" indent="0" algn="ctr">
-              <a:buNone/>
-            </a:pPr>
-            <a:r>
-              <a:rPr lang="en-US" dirty="0" smtClean="0"/>
-              <a:t>Filtering unknown messages</a:t>
-            </a:r>
-            <a:endParaRPr lang="en-US" dirty="0"/>
-          </a:p>
-        </p:txBody>
-      </p:sp>
-    </p:spTree>
-    <p:extLst>
-      <p:ext uri="{BB962C8B-B14F-4D97-AF65-F5344CB8AC3E}">
-        <p14:creationId xmlns:p14="http://schemas.microsoft.com/office/powerpoint/2010/main" val="2335944705"/>
-      </p:ext>
-    </p:extLst>
-  </p:cSld>
-  <p:clrMapOvr>
-    <a:masterClrMapping/>
-  </p:clrMapOvr>
-  <p:timing>
-    <p:tnLst>
-      <p:par>
-        <p:cTn id="1" dur="indefinite" restart="never" nodeType="tmRoot"/>
-      </p:par>
-    </p:tnLst>
-  </p:timing>
-</p:sld>
-</file>
-
-<file path=ppt/slides/slide11.xml><?xml version="1.0" encoding="utf-8"?>
-<p:sld xmlns:a="http://schemas.openxmlformats.org/drawingml/2006/main" xmlns:r="http://schemas.openxmlformats.org/officeDocument/2006/relationships" xmlns:p="http://schemas.openxmlformats.org/presentationml/2006/main">
-  <p:cSld>
-    <p:spTree>
-      <p:nvGrpSpPr>
-        <p:cNvPr id="1" name=""/>
-        <p:cNvGrpSpPr/>
-        <p:nvPr/>
-      </p:nvGrpSpPr>
-      <p:grpSpPr>
-        <a:xfrm>
-          <a:off x="0" y="0"/>
-          <a:ext cx="0" cy="0"/>
-          <a:chOff x="0" y="0"/>
-          <a:chExt cx="0" cy="0"/>
-        </a:xfrm>
-      </p:grpSpPr>
-      <p:sp>
-        <p:nvSpPr>
-          <p:cNvPr id="10" name="TextBox 9"/>
-          <p:cNvSpPr txBox="1"/>
-          <p:nvPr/>
-        </p:nvSpPr>
-        <p:spPr>
-          <a:xfrm>
-            <a:off x="381000" y="2514600"/>
-            <a:ext cx="8458200" cy="1569660"/>
-          </a:xfrm>
-          <a:prstGeom prst="rect">
-            <a:avLst/>
-          </a:prstGeom>
-          <a:noFill/>
-        </p:spPr>
-        <p:txBody>
-          <a:bodyPr wrap="square" rtlCol="0">
-            <a:spAutoFit/>
-          </a:bodyPr>
-          <a:lstStyle/>
-          <a:p>
-            <a:r>
-              <a:rPr lang="en-US" sz="3200" dirty="0" smtClean="0"/>
-              <a:t>The 15 most</a:t>
-            </a:r>
-          </a:p>
-          <a:p>
-            <a:r>
-              <a:rPr lang="en-US" sz="3200" dirty="0" smtClean="0"/>
-              <a:t>interesting words in an</a:t>
-            </a:r>
-          </a:p>
-          <a:p>
-            <a:r>
-              <a:rPr lang="en-US" sz="3200" dirty="0" smtClean="0"/>
-              <a:t>“unknown” message</a:t>
-            </a:r>
-            <a:endParaRPr lang="en-US" sz="3200" dirty="0"/>
-          </a:p>
-        </p:txBody>
-      </p:sp>
-      <p:graphicFrame>
-        <p:nvGraphicFramePr>
-          <p:cNvPr id="11" name="Table 10"/>
-          <p:cNvGraphicFramePr>
-            <a:graphicFrameLocks noGrp="1"/>
-          </p:cNvGraphicFramePr>
-          <p:nvPr>
-            <p:extLst>
-              <p:ext uri="{D42A27DB-BD31-4B8C-83A1-F6EECF244321}">
-                <p14:modId xmlns:p14="http://schemas.microsoft.com/office/powerpoint/2010/main" val="2437667187"/>
-              </p:ext>
-            </p:extLst>
-          </p:nvPr>
-        </p:nvGraphicFramePr>
-        <p:xfrm>
-          <a:off x="4419600" y="1447802"/>
-          <a:ext cx="3906054" cy="4952995"/>
-        </p:xfrm>
-        <a:graphic>
-          <a:graphicData uri="http://schemas.openxmlformats.org/drawingml/2006/table">
-            <a:tbl>
-              <a:tblPr firstRow="1" bandRow="1">
-                <a:tableStyleId>{5940675A-B579-460E-94D1-54222C63F5DA}</a:tableStyleId>
-              </a:tblPr>
-              <a:tblGrid>
-                <a:gridCol w="2243902"/>
-                <a:gridCol w="1662152"/>
-              </a:tblGrid>
-              <a:tr h="511120">
-                <a:tc>
-                  <a:txBody>
-                    <a:bodyPr/>
-                    <a:lstStyle/>
-                    <a:p>
-                      <a:r>
-                        <a:rPr lang="en-US" b="1" dirty="0" smtClean="0"/>
-                        <a:t>word</a:t>
-                      </a:r>
-                      <a:endParaRPr lang="en-US" b="1" dirty="0"/>
-                    </a:p>
-                  </a:txBody>
-                  <a:tcPr/>
-                </a:tc>
-                <a:tc>
-                  <a:txBody>
-                    <a:bodyPr/>
-                    <a:lstStyle/>
-                    <a:p>
-                      <a:r>
-                        <a:rPr lang="en-US" b="1" dirty="0" smtClean="0"/>
-                        <a:t>spam ranking</a:t>
-                      </a:r>
-                      <a:endParaRPr lang="en-US" b="1" dirty="0"/>
-                    </a:p>
-                  </a:txBody>
-                  <a:tcPr/>
-                </a:tc>
-              </a:tr>
-              <a:tr h="296125">
-                <a:tc>
-                  <a:txBody>
-                    <a:bodyPr/>
-                    <a:lstStyle/>
-                    <a:p>
-                      <a:pPr algn="l" fontAlgn="b"/>
-                      <a:r>
-                        <a:rPr lang="en-US" sz="1800" b="0" i="0" u="none" strike="noStrike" dirty="0">
-                          <a:solidFill>
-                            <a:srgbClr val="000000"/>
-                          </a:solidFill>
-                          <a:effectLst/>
-                          <a:latin typeface="Calibri"/>
-                        </a:rPr>
-                        <a:t>dreamed </a:t>
-                      </a:r>
-                    </a:p>
-                  </a:txBody>
-                  <a:tcPr marL="9525" marR="9525" marT="9525" marB="0" anchor="b"/>
-                </a:tc>
-                <a:tc>
-                  <a:txBody>
-                    <a:bodyPr/>
-                    <a:lstStyle/>
-                    <a:p>
-                      <a:pPr algn="r" fontAlgn="b"/>
-                      <a:r>
-                        <a:rPr lang="en-US" sz="1800" b="0" i="0" u="none" strike="noStrike" dirty="0">
-                          <a:solidFill>
-                            <a:srgbClr val="000000"/>
-                          </a:solidFill>
-                          <a:effectLst/>
-                          <a:latin typeface="Calibri"/>
-                        </a:rPr>
-                        <a:t>0.99</a:t>
-                      </a:r>
-                    </a:p>
-                  </a:txBody>
-                  <a:tcPr marL="9525" marR="9525" marT="9525" marB="0" anchor="b"/>
-                </a:tc>
-              </a:tr>
-              <a:tr h="296125">
-                <a:tc>
-                  <a:txBody>
-                    <a:bodyPr/>
-                    <a:lstStyle/>
-                    <a:p>
-                      <a:pPr algn="l" fontAlgn="b"/>
-                      <a:r>
-                        <a:rPr lang="en-US" sz="1800" b="0" i="0" u="none" strike="noStrike" dirty="0">
-                          <a:solidFill>
-                            <a:srgbClr val="000000"/>
-                          </a:solidFill>
-                          <a:effectLst/>
-                          <a:latin typeface="Calibri"/>
-                        </a:rPr>
-                        <a:t>apology </a:t>
-                      </a:r>
-                    </a:p>
-                  </a:txBody>
-                  <a:tcPr marL="9525" marR="9525" marT="9525" marB="0" anchor="b"/>
-                </a:tc>
-                <a:tc>
-                  <a:txBody>
-                    <a:bodyPr/>
-                    <a:lstStyle/>
-                    <a:p>
-                      <a:pPr algn="r" fontAlgn="b"/>
-                      <a:r>
-                        <a:rPr lang="en-US" sz="1800" b="0" i="0" u="none" strike="noStrike">
-                          <a:solidFill>
-                            <a:srgbClr val="000000"/>
-                          </a:solidFill>
-                          <a:effectLst/>
-                          <a:latin typeface="Calibri"/>
-                        </a:rPr>
-                        <a:t>0.99</a:t>
-                      </a:r>
-                    </a:p>
-                  </a:txBody>
-                  <a:tcPr marL="9525" marR="9525" marT="9525" marB="0" anchor="b"/>
-                </a:tc>
-              </a:tr>
-              <a:tr h="296125">
-                <a:tc>
-                  <a:txBody>
-                    <a:bodyPr/>
-                    <a:lstStyle/>
-                    <a:p>
-                      <a:pPr algn="l" fontAlgn="b"/>
-                      <a:r>
-                        <a:rPr lang="en-US" sz="1800" b="0" i="0" u="none" strike="noStrike" dirty="0">
-                          <a:solidFill>
-                            <a:srgbClr val="000000"/>
-                          </a:solidFill>
-                          <a:effectLst/>
-                          <a:latin typeface="Calibri"/>
-                        </a:rPr>
-                        <a:t>signup </a:t>
-                      </a:r>
-                    </a:p>
-                  </a:txBody>
-                  <a:tcPr marL="9525" marR="9525" marT="9525" marB="0" anchor="b"/>
-                </a:tc>
-                <a:tc>
-                  <a:txBody>
-                    <a:bodyPr/>
-                    <a:lstStyle/>
-                    <a:p>
-                      <a:pPr algn="r" fontAlgn="b"/>
-                      <a:r>
-                        <a:rPr lang="en-US" sz="1800" b="0" i="0" u="none" strike="noStrike">
-                          <a:solidFill>
-                            <a:srgbClr val="000000"/>
-                          </a:solidFill>
-                          <a:effectLst/>
-                          <a:latin typeface="Calibri"/>
-                        </a:rPr>
-                        <a:t>0.99</a:t>
-                      </a:r>
-                    </a:p>
-                  </a:txBody>
-                  <a:tcPr marL="9525" marR="9525" marT="9525" marB="0" anchor="b"/>
-                </a:tc>
-              </a:tr>
-              <a:tr h="296125">
-                <a:tc>
-                  <a:txBody>
-                    <a:bodyPr/>
-                    <a:lstStyle/>
-                    <a:p>
-                      <a:pPr algn="l" fontAlgn="b"/>
-                      <a:r>
-                        <a:rPr lang="en-US" sz="1800" b="0" i="0" u="none" strike="noStrike" dirty="0">
-                          <a:solidFill>
-                            <a:srgbClr val="000000"/>
-                          </a:solidFill>
-                          <a:effectLst/>
-                          <a:latin typeface="Calibri"/>
-                        </a:rPr>
-                        <a:t>sincere </a:t>
-                      </a:r>
-                    </a:p>
-                  </a:txBody>
-                  <a:tcPr marL="9525" marR="9525" marT="9525" marB="0" anchor="b"/>
-                </a:tc>
-                <a:tc>
-                  <a:txBody>
-                    <a:bodyPr/>
-                    <a:lstStyle/>
-                    <a:p>
-                      <a:pPr algn="r" fontAlgn="b"/>
-                      <a:r>
-                        <a:rPr lang="en-US" sz="1800" b="0" i="0" u="none" strike="noStrike">
-                          <a:solidFill>
-                            <a:srgbClr val="000000"/>
-                          </a:solidFill>
-                          <a:effectLst/>
-                          <a:latin typeface="Calibri"/>
-                        </a:rPr>
-                        <a:t>0.99</a:t>
-                      </a:r>
-                    </a:p>
-                  </a:txBody>
-                  <a:tcPr marL="9525" marR="9525" marT="9525" marB="0" anchor="b"/>
-                </a:tc>
-              </a:tr>
-              <a:tr h="296125">
-                <a:tc>
-                  <a:txBody>
-                    <a:bodyPr/>
-                    <a:lstStyle/>
-                    <a:p>
-                      <a:pPr algn="l" fontAlgn="b"/>
-                      <a:r>
-                        <a:rPr lang="en-US" sz="1800" b="0" i="0" u="none" strike="noStrike" dirty="0">
-                          <a:solidFill>
-                            <a:srgbClr val="000000"/>
-                          </a:solidFill>
-                          <a:effectLst/>
-                          <a:latin typeface="Calibri"/>
-                        </a:rPr>
-                        <a:t>click </a:t>
-                      </a:r>
-                    </a:p>
-                  </a:txBody>
-                  <a:tcPr marL="9525" marR="9525" marT="9525" marB="0" anchor="b"/>
-                </a:tc>
-                <a:tc>
-                  <a:txBody>
-                    <a:bodyPr/>
-                    <a:lstStyle/>
-                    <a:p>
-                      <a:pPr algn="r" fontAlgn="b"/>
-                      <a:r>
-                        <a:rPr lang="en-US" sz="1800" b="0" i="0" u="none" strike="noStrike">
-                          <a:solidFill>
-                            <a:srgbClr val="000000"/>
-                          </a:solidFill>
-                          <a:effectLst/>
-                          <a:latin typeface="Calibri"/>
-                        </a:rPr>
-                        <a:t>0.957991</a:t>
-                      </a:r>
-                    </a:p>
-                  </a:txBody>
-                  <a:tcPr marL="9525" marR="9525" marT="9525" marB="0" anchor="b"/>
-                </a:tc>
-              </a:tr>
-              <a:tr h="296125">
-                <a:tc>
-                  <a:txBody>
-                    <a:bodyPr/>
-                    <a:lstStyle/>
-                    <a:p>
-                      <a:pPr algn="l" fontAlgn="b"/>
-                      <a:r>
-                        <a:rPr lang="en-US" sz="1800" b="0" i="0" u="none" strike="noStrike" dirty="0" smtClean="0">
-                          <a:solidFill>
-                            <a:srgbClr val="000000"/>
-                          </a:solidFill>
-                          <a:effectLst/>
-                          <a:latin typeface="Calibri"/>
-                        </a:rPr>
-                        <a:t>earn</a:t>
-                      </a:r>
-                      <a:endParaRPr lang="en-US" sz="1800" b="0" i="0" u="none" strike="noStrike" dirty="0">
-                        <a:solidFill>
-                          <a:srgbClr val="000000"/>
-                        </a:solidFill>
-                        <a:effectLst/>
-                        <a:latin typeface="Calibri"/>
-                      </a:endParaRPr>
-                    </a:p>
-                  </a:txBody>
-                  <a:tcPr marL="9525" marR="9525" marT="9525" marB="0" anchor="b"/>
-                </a:tc>
-                <a:tc>
-                  <a:txBody>
-                    <a:bodyPr/>
-                    <a:lstStyle/>
-                    <a:p>
-                      <a:pPr algn="r" fontAlgn="b"/>
-                      <a:r>
-                        <a:rPr lang="en-US" sz="1800" b="0" i="0" u="none" strike="noStrike" dirty="0">
-                          <a:solidFill>
-                            <a:srgbClr val="000000"/>
-                          </a:solidFill>
-                          <a:effectLst/>
-                          <a:latin typeface="Calibri"/>
-                        </a:rPr>
-                        <a:t>0.946141</a:t>
-                      </a:r>
-                    </a:p>
-                  </a:txBody>
-                  <a:tcPr marL="9525" marR="9525" marT="9525" marB="0" anchor="b"/>
-                </a:tc>
-              </a:tr>
-              <a:tr h="296125">
-                <a:tc>
-                  <a:txBody>
-                    <a:bodyPr/>
-                    <a:lstStyle/>
-                    <a:p>
-                      <a:pPr algn="l" fontAlgn="b"/>
-                      <a:r>
-                        <a:rPr lang="en-US" sz="1800" b="0" i="0" u="none" strike="noStrike" dirty="0">
-                          <a:solidFill>
-                            <a:srgbClr val="000000"/>
-                          </a:solidFill>
-                          <a:effectLst/>
-                          <a:latin typeface="Calibri"/>
-                        </a:rPr>
-                        <a:t>financially </a:t>
-                      </a:r>
-                    </a:p>
-                  </a:txBody>
-                  <a:tcPr marL="9525" marR="9525" marT="9525" marB="0" anchor="b"/>
-                </a:tc>
-                <a:tc>
-                  <a:txBody>
-                    <a:bodyPr/>
-                    <a:lstStyle/>
-                    <a:p>
-                      <a:pPr algn="r" fontAlgn="b"/>
-                      <a:r>
-                        <a:rPr lang="en-US" sz="1800" b="0" i="0" u="none" strike="noStrike" dirty="0">
-                          <a:solidFill>
-                            <a:srgbClr val="000000"/>
-                          </a:solidFill>
-                          <a:effectLst/>
-                          <a:latin typeface="Calibri"/>
-                        </a:rPr>
-                        <a:t>0.944645</a:t>
-                      </a:r>
-                    </a:p>
-                  </a:txBody>
-                  <a:tcPr marL="9525" marR="9525" marT="9525" marB="0" anchor="b"/>
-                </a:tc>
-              </a:tr>
-              <a:tr h="296125">
-                <a:tc>
-                  <a:txBody>
-                    <a:bodyPr/>
-                    <a:lstStyle/>
-                    <a:p>
-                      <a:pPr algn="l" fontAlgn="b"/>
-                      <a:r>
-                        <a:rPr lang="en-US" sz="1800" b="0" i="0" u="none" strike="noStrike" dirty="0">
-                          <a:solidFill>
-                            <a:srgbClr val="000000"/>
-                          </a:solidFill>
-                          <a:effectLst/>
-                          <a:latin typeface="Calibri"/>
-                        </a:rPr>
-                        <a:t>marketing </a:t>
-                      </a:r>
-                    </a:p>
-                  </a:txBody>
-                  <a:tcPr marL="9525" marR="9525" marT="9525" marB="0" anchor="b"/>
-                </a:tc>
-                <a:tc>
-                  <a:txBody>
-                    <a:bodyPr/>
-                    <a:lstStyle/>
-                    <a:p>
-                      <a:pPr algn="r" fontAlgn="b"/>
-                      <a:r>
-                        <a:rPr lang="en-US" sz="1800" b="0" i="0" u="none" strike="noStrike">
-                          <a:solidFill>
-                            <a:srgbClr val="000000"/>
-                          </a:solidFill>
-                          <a:effectLst/>
-                          <a:latin typeface="Calibri"/>
-                        </a:rPr>
-                        <a:t>0.944504</a:t>
-                      </a:r>
-                    </a:p>
-                  </a:txBody>
-                  <a:tcPr marL="9525" marR="9525" marT="9525" marB="0" anchor="b"/>
-                </a:tc>
-              </a:tr>
-              <a:tr h="296125">
-                <a:tc>
-                  <a:txBody>
-                    <a:bodyPr/>
-                    <a:lstStyle/>
-                    <a:p>
-                      <a:pPr algn="l" fontAlgn="b"/>
-                      <a:r>
-                        <a:rPr lang="en-US" sz="1800" b="0" i="0" u="none" strike="noStrike" dirty="0">
-                          <a:solidFill>
-                            <a:srgbClr val="000000"/>
-                          </a:solidFill>
-                          <a:effectLst/>
-                          <a:latin typeface="Calibri"/>
-                        </a:rPr>
-                        <a:t>sales </a:t>
-                      </a:r>
-                    </a:p>
-                  </a:txBody>
-                  <a:tcPr marL="9525" marR="9525" marT="9525" marB="0" anchor="b"/>
-                </a:tc>
-                <a:tc>
-                  <a:txBody>
-                    <a:bodyPr/>
-                    <a:lstStyle/>
-                    <a:p>
-                      <a:pPr algn="r" fontAlgn="b"/>
-                      <a:r>
-                        <a:rPr lang="en-US" sz="1800" b="0" i="0" u="none" strike="noStrike">
-                          <a:solidFill>
-                            <a:srgbClr val="000000"/>
-                          </a:solidFill>
-                          <a:effectLst/>
-                          <a:latin typeface="Calibri"/>
-                        </a:rPr>
-                        <a:t>0.941633</a:t>
-                      </a:r>
-                    </a:p>
-                  </a:txBody>
-                  <a:tcPr marL="9525" marR="9525" marT="9525" marB="0" anchor="b"/>
-                </a:tc>
-              </a:tr>
-              <a:tr h="296125">
-                <a:tc>
-                  <a:txBody>
-                    <a:bodyPr/>
-                    <a:lstStyle/>
-                    <a:p>
-                      <a:pPr algn="l" fontAlgn="b"/>
-                      <a:r>
-                        <a:rPr lang="en-US" sz="1800" b="0" i="0" u="none" strike="noStrike" dirty="0">
-                          <a:solidFill>
-                            <a:srgbClr val="000000"/>
-                          </a:solidFill>
-                          <a:effectLst/>
-                          <a:latin typeface="Calibri"/>
-                        </a:rPr>
-                        <a:t>receive </a:t>
-                      </a:r>
-                    </a:p>
-                  </a:txBody>
-                  <a:tcPr marL="9525" marR="9525" marT="9525" marB="0" anchor="b"/>
-                </a:tc>
-                <a:tc>
-                  <a:txBody>
-                    <a:bodyPr/>
-                    <a:lstStyle/>
-                    <a:p>
-                      <a:pPr algn="r" fontAlgn="b"/>
-                      <a:r>
-                        <a:rPr lang="en-US" sz="1800" b="0" i="0" u="none" strike="noStrike" dirty="0">
-                          <a:solidFill>
-                            <a:srgbClr val="000000"/>
-                          </a:solidFill>
-                          <a:effectLst/>
-                          <a:latin typeface="Calibri"/>
-                        </a:rPr>
-                        <a:t>0.935902</a:t>
-                      </a:r>
-                    </a:p>
-                  </a:txBody>
-                  <a:tcPr marL="9525" marR="9525" marT="9525" marB="0" anchor="b"/>
-                </a:tc>
-              </a:tr>
-              <a:tr h="296125">
-                <a:tc>
-                  <a:txBody>
-                    <a:bodyPr/>
-                    <a:lstStyle/>
-                    <a:p>
-                      <a:pPr algn="l" fontAlgn="b"/>
-                      <a:r>
-                        <a:rPr lang="en-US" sz="1800" b="0" i="0" u="none" strike="noStrike" dirty="0">
-                          <a:solidFill>
-                            <a:srgbClr val="000000"/>
-                          </a:solidFill>
-                          <a:effectLst/>
-                          <a:latin typeface="Calibri"/>
-                        </a:rPr>
-                        <a:t>root </a:t>
-                      </a:r>
-                    </a:p>
-                  </a:txBody>
-                  <a:tcPr marL="9525" marR="9525" marT="9525" marB="0" anchor="b"/>
-                </a:tc>
-                <a:tc>
-                  <a:txBody>
-                    <a:bodyPr/>
-                    <a:lstStyle/>
-                    <a:p>
-                      <a:pPr algn="r" fontAlgn="b"/>
-                      <a:r>
-                        <a:rPr lang="en-US" sz="1800" b="0" i="0" u="none" strike="noStrike" dirty="0">
-                          <a:solidFill>
-                            <a:srgbClr val="000000"/>
-                          </a:solidFill>
-                          <a:effectLst/>
-                          <a:latin typeface="Calibri"/>
-                        </a:rPr>
-                        <a:t>0.08116</a:t>
-                      </a:r>
-                    </a:p>
-                  </a:txBody>
-                  <a:tcPr marL="9525" marR="9525" marT="9525" marB="0" anchor="b"/>
-                </a:tc>
-              </a:tr>
-              <a:tr h="296125">
-                <a:tc>
-                  <a:txBody>
-                    <a:bodyPr/>
-                    <a:lstStyle/>
-                    <a:p>
-                      <a:pPr algn="l" fontAlgn="b"/>
-                      <a:r>
-                        <a:rPr lang="en-US" sz="1800" b="0" i="0" u="none" strike="noStrike" dirty="0" err="1">
-                          <a:solidFill>
-                            <a:srgbClr val="000000"/>
-                          </a:solidFill>
-                          <a:effectLst/>
-                          <a:latin typeface="Calibri"/>
-                        </a:rPr>
-                        <a:t>tuatha</a:t>
-                      </a:r>
-                      <a:r>
-                        <a:rPr lang="en-US" sz="1800" b="0" i="0" u="none" strike="noStrike" dirty="0">
-                          <a:solidFill>
-                            <a:srgbClr val="000000"/>
-                          </a:solidFill>
-                          <a:effectLst/>
-                          <a:latin typeface="Calibri"/>
-                        </a:rPr>
-                        <a:t> </a:t>
-                      </a:r>
-                    </a:p>
-                  </a:txBody>
-                  <a:tcPr marL="9525" marR="9525" marT="9525" marB="0" anchor="b"/>
-                </a:tc>
-                <a:tc>
-                  <a:txBody>
-                    <a:bodyPr/>
-                    <a:lstStyle/>
-                    <a:p>
-                      <a:pPr algn="r" fontAlgn="b"/>
-                      <a:r>
-                        <a:rPr lang="en-US" sz="1800" b="0" i="0" u="none" strike="noStrike" dirty="0">
-                          <a:solidFill>
-                            <a:srgbClr val="000000"/>
-                          </a:solidFill>
-                          <a:effectLst/>
-                          <a:latin typeface="Calibri"/>
-                        </a:rPr>
-                        <a:t>0.071936</a:t>
-                      </a:r>
-                    </a:p>
-                  </a:txBody>
-                  <a:tcPr marL="9525" marR="9525" marT="9525" marB="0" anchor="b"/>
-                </a:tc>
-              </a:tr>
-              <a:tr h="296125">
-                <a:tc>
-                  <a:txBody>
-                    <a:bodyPr/>
-                    <a:lstStyle/>
-                    <a:p>
-                      <a:pPr algn="l" fontAlgn="b"/>
-                      <a:r>
-                        <a:rPr lang="en-US" sz="1800" b="0" i="0" u="none" strike="noStrike" dirty="0">
-                          <a:solidFill>
-                            <a:srgbClr val="000000"/>
-                          </a:solidFill>
-                          <a:effectLst/>
-                          <a:latin typeface="Calibri"/>
-                        </a:rPr>
-                        <a:t>flowed </a:t>
-                      </a:r>
-                    </a:p>
-                  </a:txBody>
-                  <a:tcPr marL="9525" marR="9525" marT="9525" marB="0" anchor="b"/>
-                </a:tc>
-                <a:tc>
-                  <a:txBody>
-                    <a:bodyPr/>
-                    <a:lstStyle/>
-                    <a:p>
-                      <a:pPr algn="r" fontAlgn="b"/>
-                      <a:r>
-                        <a:rPr lang="en-US" sz="1800" b="0" i="0" u="none" strike="noStrike" dirty="0">
-                          <a:solidFill>
-                            <a:srgbClr val="000000"/>
-                          </a:solidFill>
-                          <a:effectLst/>
-                          <a:latin typeface="Calibri"/>
-                        </a:rPr>
-                        <a:t>0.050182</a:t>
-                      </a:r>
-                    </a:p>
-                  </a:txBody>
-                  <a:tcPr marL="9525" marR="9525" marT="9525" marB="0" anchor="b"/>
-                </a:tc>
-              </a:tr>
-              <a:tr h="296125">
-                <a:tc>
-                  <a:txBody>
-                    <a:bodyPr/>
-                    <a:lstStyle/>
-                    <a:p>
-                      <a:pPr algn="l" fontAlgn="b"/>
-                      <a:r>
-                        <a:rPr lang="en-US" sz="1800" b="0" i="0" u="none" strike="noStrike" dirty="0" err="1">
-                          <a:solidFill>
-                            <a:srgbClr val="000000"/>
-                          </a:solidFill>
-                          <a:effectLst/>
-                          <a:latin typeface="Calibri"/>
-                        </a:rPr>
-                        <a:t>listmaster</a:t>
-                      </a:r>
-                      <a:r>
-                        <a:rPr lang="en-US" sz="1800" b="0" i="0" u="none" strike="noStrike" dirty="0">
-                          <a:solidFill>
-                            <a:srgbClr val="000000"/>
-                          </a:solidFill>
-                          <a:effectLst/>
-                          <a:latin typeface="Calibri"/>
-                        </a:rPr>
-                        <a:t> </a:t>
-                      </a:r>
-                    </a:p>
-                  </a:txBody>
-                  <a:tcPr marL="9525" marR="9525" marT="9525" marB="0" anchor="b"/>
-                </a:tc>
-                <a:tc>
-                  <a:txBody>
-                    <a:bodyPr/>
-                    <a:lstStyle/>
-                    <a:p>
-                      <a:pPr algn="r" fontAlgn="b"/>
-                      <a:r>
-                        <a:rPr lang="en-US" sz="1800" b="0" i="0" u="none" strike="noStrike" dirty="0">
-                          <a:solidFill>
-                            <a:srgbClr val="000000"/>
-                          </a:solidFill>
-                          <a:effectLst/>
-                          <a:latin typeface="Calibri"/>
-                        </a:rPr>
-                        <a:t>0.047491</a:t>
-                      </a:r>
-                    </a:p>
-                  </a:txBody>
-                  <a:tcPr marL="9525" marR="9525" marT="9525" marB="0" anchor="b"/>
-                </a:tc>
-              </a:tr>
-              <a:tr h="296125">
-                <a:tc>
-                  <a:txBody>
-                    <a:bodyPr/>
-                    <a:lstStyle/>
-                    <a:p>
-                      <a:pPr algn="l" fontAlgn="b"/>
-                      <a:r>
-                        <a:rPr lang="en-US" sz="1800" b="0" i="0" u="none" strike="noStrike" smtClean="0">
-                          <a:solidFill>
-                            <a:srgbClr val="000000"/>
-                          </a:solidFill>
-                          <a:effectLst/>
-                          <a:latin typeface="Calibri"/>
-                        </a:rPr>
-                        <a:t>maintainer </a:t>
-                      </a:r>
-                      <a:endParaRPr lang="en-US" sz="1800" b="0" i="0" u="none" strike="noStrike" dirty="0">
-                        <a:solidFill>
-                          <a:srgbClr val="000000"/>
-                        </a:solidFill>
-                        <a:effectLst/>
-                        <a:latin typeface="Calibri"/>
-                      </a:endParaRPr>
-                    </a:p>
-                  </a:txBody>
-                  <a:tcPr marL="9525" marR="9525" marT="9525" marB="0" anchor="b"/>
-                </a:tc>
-                <a:tc>
-                  <a:txBody>
-                    <a:bodyPr/>
-                    <a:lstStyle/>
-                    <a:p>
-                      <a:pPr algn="r" fontAlgn="b"/>
-                      <a:r>
-                        <a:rPr lang="en-US" sz="1800" b="0" i="0" u="none" strike="noStrike" dirty="0">
-                          <a:solidFill>
-                            <a:srgbClr val="000000"/>
-                          </a:solidFill>
-                          <a:effectLst/>
-                          <a:latin typeface="Calibri"/>
-                        </a:rPr>
-                        <a:t>0.045326</a:t>
-                      </a:r>
-                    </a:p>
-                  </a:txBody>
-                  <a:tcPr marL="9525" marR="9525" marT="9525" marB="0" anchor="b"/>
-                </a:tc>
-              </a:tr>
-            </a:tbl>
-          </a:graphicData>
-        </a:graphic>
-      </p:graphicFrame>
-    </p:spTree>
-    <p:extLst>
-      <p:ext uri="{BB962C8B-B14F-4D97-AF65-F5344CB8AC3E}">
-        <p14:creationId xmlns:p14="http://schemas.microsoft.com/office/powerpoint/2010/main" val="1770042670"/>
-      </p:ext>
-    </p:extLst>
-  </p:cSld>
-  <p:clrMapOvr>
-    <a:masterClrMapping/>
-  </p:clrMapOvr>
-  <p:timing>
-    <p:tnLst>
-      <p:par>
-        <p:cTn id="1" dur="indefinite" restart="never" nodeType="tmRoot"/>
-      </p:par>
-    </p:tnLst>
-  </p:timing>
-</p:sld>
-</file>
-
-<file path=ppt/slides/slide12.xml><?xml version="1.0" encoding="utf-8"?>
 <p:sld xmlns:a="http://schemas.openxmlformats.org/drawingml/2006/main" xmlns:r="http://schemas.openxmlformats.org/officeDocument/2006/relationships" xmlns:p="http://schemas.openxmlformats.org/presentationml/2006/main">
   <p:cSld>
     <p:spTree>
@@ -5356,7 +4486,7 @@
 </p:sld>
 </file>
 
-<file path=ppt/slides/slide13.xml><?xml version="1.0" encoding="utf-8"?>
+<file path=ppt/slides/slide11.xml><?xml version="1.0" encoding="utf-8"?>
 <p:sld xmlns:a="http://schemas.openxmlformats.org/drawingml/2006/main" xmlns:r="http://schemas.openxmlformats.org/officeDocument/2006/relationships" xmlns:p="http://schemas.openxmlformats.org/presentationml/2006/main">
   <p:cSld>
     <p:spTree>
@@ -5407,8 +4537,8 @@
           </a:p>
         </p:txBody>
       </p:sp>
-      <mc:AlternateContent xmlns:mc="http://schemas.openxmlformats.org/markup-compatibility/2006">
-        <mc:Choice xmlns:a14="http://schemas.microsoft.com/office/drawing/2010/main" Requires="a14">
+      <mc:AlternateContent xmlns:mc="http://schemas.openxmlformats.org/markup-compatibility/2006" xmlns:a14="http://schemas.microsoft.com/office/drawing/2010/main">
+        <mc:Choice Requires="a14">
           <p:sp>
             <p:nvSpPr>
               <p:cNvPr id="12" name="TextBox 11"/>
@@ -5490,7 +4620,7 @@
             </p:txBody>
           </p:sp>
         </mc:Choice>
-        <mc:Fallback>
+        <mc:Fallback xmlns="">
           <p:sp>
             <p:nvSpPr>
               <p:cNvPr id="12" name="TextBox 11"/>
@@ -6311,7 +5441,7 @@
 </p:sld>
 </file>
 
-<file path=ppt/slides/slide14.xml><?xml version="1.0" encoding="utf-8"?>
+<file path=ppt/slides/slide12.xml><?xml version="1.0" encoding="utf-8"?>
 <p:sld xmlns:a="http://schemas.openxmlformats.org/drawingml/2006/main" xmlns:r="http://schemas.openxmlformats.org/officeDocument/2006/relationships" xmlns:p="http://schemas.openxmlformats.org/presentationml/2006/main">
   <p:cSld>
     <p:spTree>
@@ -6362,8 +5492,8 @@
           </a:p>
         </p:txBody>
       </p:sp>
-      <mc:AlternateContent xmlns:mc="http://schemas.openxmlformats.org/markup-compatibility/2006">
-        <mc:Choice xmlns:a14="http://schemas.microsoft.com/office/drawing/2010/main" Requires="a14">
+      <mc:AlternateContent xmlns:mc="http://schemas.openxmlformats.org/markup-compatibility/2006" xmlns:a14="http://schemas.microsoft.com/office/drawing/2010/main">
+        <mc:Choice Requires="a14">
           <p:sp>
             <p:nvSpPr>
               <p:cNvPr id="4" name="Rectangle 3"/>
@@ -6401,64 +5531,88 @@
                 <a14:m>
                   <m:oMath xmlns:m="http://schemas.openxmlformats.org/officeDocument/2006/math">
                     <m:r>
-                      <a:rPr lang="en-US" i="1"/>
+                      <a:rPr lang="en-US" i="1">
+                        <a:latin typeface="Cambria Math"/>
+                      </a:rPr>
                       <m:t>𝑃</m:t>
                     </m:r>
                     <m:d>
                       <m:dPr>
                         <m:ctrlPr>
-                          <a:rPr lang="en-US" i="1"/>
+                          <a:rPr lang="en-US" i="1">
+                            <a:latin typeface="Cambria Math"/>
+                          </a:rPr>
                         </m:ctrlPr>
                       </m:dPr>
                       <m:e>
                         <m:r>
-                          <a:rPr lang="en-US" i="1"/>
+                          <a:rPr lang="en-US" i="1">
+                            <a:latin typeface="Cambria Math"/>
+                          </a:rPr>
                           <m:t>𝑚𝑒𝑠𝑠𝑎𝑔𝑒</m:t>
                         </m:r>
                         <m:r>
-                          <a:rPr lang="en-US" i="1"/>
+                          <a:rPr lang="en-US" i="1">
+                            <a:latin typeface="Cambria Math"/>
+                          </a:rPr>
                           <m:t> </m:t>
                         </m:r>
                         <m:r>
-                          <a:rPr lang="en-US" i="1"/>
+                          <a:rPr lang="en-US" i="1">
+                            <a:latin typeface="Cambria Math"/>
+                          </a:rPr>
                           <m:t>𝑖𝑠</m:t>
                         </m:r>
                         <m:r>
-                          <a:rPr lang="en-US" i="1"/>
+                          <a:rPr lang="en-US" i="1">
+                            <a:latin typeface="Cambria Math"/>
+                          </a:rPr>
                           <m:t> </m:t>
                         </m:r>
                         <m:r>
-                          <a:rPr lang="en-US" i="1"/>
+                          <a:rPr lang="en-US" i="1">
+                            <a:latin typeface="Cambria Math"/>
+                          </a:rPr>
                           <m:t>𝑠𝑝𝑎𝑚</m:t>
                         </m:r>
                       </m:e>
                     </m:d>
                     <m:r>
-                      <a:rPr lang="en-US" i="1"/>
+                      <a:rPr lang="en-US" i="1">
+                        <a:latin typeface="Cambria Math"/>
+                      </a:rPr>
                       <m:t>=</m:t>
                     </m:r>
                     <m:f>
                       <m:fPr>
                         <m:ctrlPr>
-                          <a:rPr lang="en-US" i="1"/>
+                          <a:rPr lang="en-US" i="1">
+                            <a:latin typeface="Cambria Math"/>
+                          </a:rPr>
                         </m:ctrlPr>
                       </m:fPr>
                       <m:num>
                         <m:sSub>
                           <m:sSubPr>
                             <m:ctrlPr>
-                              <a:rPr lang="en-US" i="1"/>
+                              <a:rPr lang="en-US" i="1">
+                                <a:latin typeface="Cambria Math"/>
+                              </a:rPr>
                             </m:ctrlPr>
                           </m:sSubPr>
                           <m:e>
                             <m:r>
-                              <a:rPr lang="en-US" i="1"/>
+                              <a:rPr lang="en-US" i="1">
+                                <a:latin typeface="Cambria Math"/>
+                              </a:rPr>
                               <m:t>𝑝</m:t>
                             </m:r>
                           </m:e>
                           <m:sub>
                             <m:r>
-                              <a:rPr lang="en-US" i="1"/>
+                              <a:rPr lang="en-US" i="1">
+                                <a:latin typeface="Cambria Math"/>
+                              </a:rPr>
                               <m:t>1</m:t>
                             </m:r>
                           </m:sub>
@@ -6466,18 +5620,24 @@
                         <m:sSub>
                           <m:sSubPr>
                             <m:ctrlPr>
-                              <a:rPr lang="en-US" i="1"/>
+                              <a:rPr lang="en-US" i="1">
+                                <a:latin typeface="Cambria Math"/>
+                              </a:rPr>
                             </m:ctrlPr>
                           </m:sSubPr>
                           <m:e>
                             <m:r>
-                              <a:rPr lang="en-US" i="1"/>
+                              <a:rPr lang="en-US" i="1">
+                                <a:latin typeface="Cambria Math"/>
+                              </a:rPr>
                               <m:t>𝑝</m:t>
                             </m:r>
                           </m:e>
                           <m:sub>
                             <m:r>
-                              <a:rPr lang="en-US" i="1"/>
+                              <a:rPr lang="en-US" i="1">
+                                <a:latin typeface="Cambria Math"/>
+                              </a:rPr>
                               <m:t>2</m:t>
                             </m:r>
                           </m:sub>
@@ -6485,41 +5645,55 @@
                         <m:sSub>
                           <m:sSubPr>
                             <m:ctrlPr>
-                              <a:rPr lang="en-US" i="1"/>
+                              <a:rPr lang="en-US" i="1">
+                                <a:latin typeface="Cambria Math"/>
+                              </a:rPr>
                             </m:ctrlPr>
                           </m:sSubPr>
                           <m:e>
                             <m:r>
-                              <a:rPr lang="en-US" i="1"/>
+                              <a:rPr lang="en-US" i="1">
+                                <a:latin typeface="Cambria Math"/>
+                              </a:rPr>
                               <m:t>𝑝</m:t>
                             </m:r>
                           </m:e>
                           <m:sub>
                             <m:r>
-                              <a:rPr lang="en-US" i="1"/>
+                              <a:rPr lang="en-US" i="1">
+                                <a:latin typeface="Cambria Math"/>
+                              </a:rPr>
                               <m:t>3</m:t>
                             </m:r>
                           </m:sub>
                         </m:sSub>
                         <m:r>
-                          <a:rPr lang="en-US" i="1"/>
+                          <a:rPr lang="en-US" i="1">
+                            <a:latin typeface="Cambria Math"/>
+                          </a:rPr>
                           <m:t>⋯</m:t>
                         </m:r>
                         <m:sSub>
                           <m:sSubPr>
                             <m:ctrlPr>
-                              <a:rPr lang="en-US" i="1"/>
+                              <a:rPr lang="en-US" i="1">
+                                <a:latin typeface="Cambria Math"/>
+                              </a:rPr>
                             </m:ctrlPr>
                           </m:sSubPr>
                           <m:e>
                             <m:r>
-                              <a:rPr lang="en-US" i="1"/>
+                              <a:rPr lang="en-US" i="1">
+                                <a:latin typeface="Cambria Math"/>
+                              </a:rPr>
                               <m:t>𝑝</m:t>
                             </m:r>
                           </m:e>
                           <m:sub>
                             <m:r>
-                              <a:rPr lang="en-US" i="1"/>
+                              <a:rPr lang="en-US" i="1">
+                                <a:latin typeface="Cambria Math"/>
+                              </a:rPr>
                               <m:t>15</m:t>
                             </m:r>
                           </m:sub>
@@ -6529,18 +5703,24 @@
                         <m:sSub>
                           <m:sSubPr>
                             <m:ctrlPr>
-                              <a:rPr lang="en-US" i="1"/>
+                              <a:rPr lang="en-US" i="1">
+                                <a:latin typeface="Cambria Math"/>
+                              </a:rPr>
                             </m:ctrlPr>
                           </m:sSubPr>
                           <m:e>
                             <m:r>
-                              <a:rPr lang="en-US" i="1"/>
+                              <a:rPr lang="en-US" i="1">
+                                <a:latin typeface="Cambria Math"/>
+                              </a:rPr>
                               <m:t>𝑝</m:t>
                             </m:r>
                           </m:e>
                           <m:sub>
                             <m:r>
-                              <a:rPr lang="en-US" i="1"/>
+                              <a:rPr lang="en-US" i="1">
+                                <a:latin typeface="Cambria Math"/>
+                              </a:rPr>
                               <m:t>1</m:t>
                             </m:r>
                           </m:sub>
@@ -6548,18 +5728,24 @@
                         <m:sSub>
                           <m:sSubPr>
                             <m:ctrlPr>
-                              <a:rPr lang="en-US" i="1"/>
+                              <a:rPr lang="en-US" i="1">
+                                <a:latin typeface="Cambria Math"/>
+                              </a:rPr>
                             </m:ctrlPr>
                           </m:sSubPr>
                           <m:e>
                             <m:r>
-                              <a:rPr lang="en-US" i="1"/>
+                              <a:rPr lang="en-US" i="1">
+                                <a:latin typeface="Cambria Math"/>
+                              </a:rPr>
                               <m:t>𝑝</m:t>
                             </m:r>
                           </m:e>
                           <m:sub>
                             <m:r>
-                              <a:rPr lang="en-US" i="1"/>
+                              <a:rPr lang="en-US" i="1">
+                                <a:latin typeface="Cambria Math"/>
+                              </a:rPr>
                               <m:t>2</m:t>
                             </m:r>
                           </m:sub>
@@ -6567,75 +5753,101 @@
                         <m:sSub>
                           <m:sSubPr>
                             <m:ctrlPr>
-                              <a:rPr lang="en-US" i="1"/>
+                              <a:rPr lang="en-US" i="1">
+                                <a:latin typeface="Cambria Math"/>
+                              </a:rPr>
                             </m:ctrlPr>
                           </m:sSubPr>
                           <m:e>
                             <m:r>
-                              <a:rPr lang="en-US" i="1"/>
+                              <a:rPr lang="en-US" i="1">
+                                <a:latin typeface="Cambria Math"/>
+                              </a:rPr>
                               <m:t>𝑝</m:t>
                             </m:r>
                           </m:e>
                           <m:sub>
                             <m:r>
-                              <a:rPr lang="en-US" i="1"/>
+                              <a:rPr lang="en-US" i="1">
+                                <a:latin typeface="Cambria Math"/>
+                              </a:rPr>
                               <m:t>3</m:t>
                             </m:r>
                           </m:sub>
                         </m:sSub>
                         <m:r>
-                          <a:rPr lang="en-US" i="1"/>
+                          <a:rPr lang="en-US" i="1">
+                            <a:latin typeface="Cambria Math"/>
+                          </a:rPr>
                           <m:t>⋯</m:t>
                         </m:r>
                         <m:sSub>
                           <m:sSubPr>
                             <m:ctrlPr>
-                              <a:rPr lang="en-US" i="1"/>
+                              <a:rPr lang="en-US" i="1">
+                                <a:latin typeface="Cambria Math"/>
+                              </a:rPr>
                             </m:ctrlPr>
                           </m:sSubPr>
                           <m:e>
                             <m:r>
-                              <a:rPr lang="en-US" i="1"/>
+                              <a:rPr lang="en-US" i="1">
+                                <a:latin typeface="Cambria Math"/>
+                              </a:rPr>
                               <m:t>𝑝</m:t>
                             </m:r>
                           </m:e>
                           <m:sub>
                             <m:r>
-                              <a:rPr lang="en-US" i="1"/>
+                              <a:rPr lang="en-US" i="1">
+                                <a:latin typeface="Cambria Math"/>
+                              </a:rPr>
                               <m:t>15</m:t>
                             </m:r>
                           </m:sub>
                         </m:sSub>
                         <m:r>
-                          <a:rPr lang="en-US" i="1"/>
+                          <a:rPr lang="en-US" i="1">
+                            <a:latin typeface="Cambria Math"/>
+                          </a:rPr>
                           <m:t>+</m:t>
                         </m:r>
                         <m:d>
                           <m:dPr>
                             <m:ctrlPr>
-                              <a:rPr lang="en-US" i="1"/>
+                              <a:rPr lang="en-US" i="1">
+                                <a:latin typeface="Cambria Math"/>
+                              </a:rPr>
                             </m:ctrlPr>
                           </m:dPr>
                           <m:e>
                             <m:r>
-                              <a:rPr lang="en-US" i="1"/>
+                              <a:rPr lang="en-US" i="1">
+                                <a:latin typeface="Cambria Math"/>
+                              </a:rPr>
                               <m:t>1−</m:t>
                             </m:r>
                             <m:sSub>
                               <m:sSubPr>
                                 <m:ctrlPr>
-                                  <a:rPr lang="en-US" i="1"/>
+                                  <a:rPr lang="en-US" i="1">
+                                    <a:latin typeface="Cambria Math"/>
+                                  </a:rPr>
                                 </m:ctrlPr>
                               </m:sSubPr>
                               <m:e>
                                 <m:r>
-                                  <a:rPr lang="en-US" i="1"/>
+                                  <a:rPr lang="en-US" i="1">
+                                    <a:latin typeface="Cambria Math"/>
+                                  </a:rPr>
                                   <m:t>𝑝</m:t>
                                 </m:r>
                               </m:e>
                               <m:sub>
                                 <m:r>
-                                  <a:rPr lang="en-US" i="1"/>
+                                  <a:rPr lang="en-US" i="1">
+                                    <a:latin typeface="Cambria Math"/>
+                                  </a:rPr>
                                   <m:t>1</m:t>
                                 </m:r>
                               </m:sub>
@@ -6645,29 +5857,39 @@
                         <m:d>
                           <m:dPr>
                             <m:ctrlPr>
-                              <a:rPr lang="en-US" i="1"/>
+                              <a:rPr lang="en-US" i="1">
+                                <a:latin typeface="Cambria Math"/>
+                              </a:rPr>
                             </m:ctrlPr>
                           </m:dPr>
                           <m:e>
                             <m:r>
-                              <a:rPr lang="en-US" i="1"/>
+                              <a:rPr lang="en-US" i="1">
+                                <a:latin typeface="Cambria Math"/>
+                              </a:rPr>
                               <m:t>1−</m:t>
                             </m:r>
                             <m:sSub>
                               <m:sSubPr>
                                 <m:ctrlPr>
-                                  <a:rPr lang="en-US" i="1"/>
+                                  <a:rPr lang="en-US" i="1">
+                                    <a:latin typeface="Cambria Math"/>
+                                  </a:rPr>
                                 </m:ctrlPr>
                               </m:sSubPr>
                               <m:e>
                                 <m:r>
-                                  <a:rPr lang="en-US" i="1"/>
+                                  <a:rPr lang="en-US" i="1">
+                                    <a:latin typeface="Cambria Math"/>
+                                  </a:rPr>
                                   <m:t>𝑝</m:t>
                                 </m:r>
                               </m:e>
                               <m:sub>
                                 <m:r>
-                                  <a:rPr lang="en-US" i="1"/>
+                                  <a:rPr lang="en-US" i="1">
+                                    <a:latin typeface="Cambria Math"/>
+                                  </a:rPr>
                                   <m:t>1</m:t>
                                 </m:r>
                               </m:sub>
@@ -6675,30 +5897,40 @@
                           </m:e>
                         </m:d>
                         <m:r>
-                          <a:rPr lang="en-US" i="1"/>
+                          <a:rPr lang="en-US" i="1">
+                            <a:latin typeface="Cambria Math"/>
+                          </a:rPr>
                           <m:t>⋯(1−</m:t>
                         </m:r>
                         <m:sSub>
                           <m:sSubPr>
                             <m:ctrlPr>
-                              <a:rPr lang="en-US" i="1"/>
+                              <a:rPr lang="en-US" i="1">
+                                <a:latin typeface="Cambria Math"/>
+                              </a:rPr>
                             </m:ctrlPr>
                           </m:sSubPr>
                           <m:e>
                             <m:r>
-                              <a:rPr lang="en-US" i="1"/>
+                              <a:rPr lang="en-US" i="1">
+                                <a:latin typeface="Cambria Math"/>
+                              </a:rPr>
                               <m:t>𝑝</m:t>
                             </m:r>
                           </m:e>
                           <m:sub>
                             <m:r>
-                              <a:rPr lang="en-US" i="1"/>
+                              <a:rPr lang="en-US" i="1">
+                                <a:latin typeface="Cambria Math"/>
+                              </a:rPr>
                               <m:t>15</m:t>
                             </m:r>
                           </m:sub>
                         </m:sSub>
                         <m:r>
-                          <a:rPr lang="en-US" i="1"/>
+                          <a:rPr lang="en-US" i="1">
+                            <a:latin typeface="Cambria Math"/>
+                          </a:rPr>
                           <m:t>)</m:t>
                         </m:r>
                       </m:den>
@@ -6714,6 +5946,7 @@
                 </a:r>
               </a:p>
               <a:p>
+                <a:pPr/>
                 <a14:m>
                   <m:oMathPara xmlns:m="http://schemas.openxmlformats.org/officeDocument/2006/math">
                     <m:oMathParaPr>
@@ -6721,60 +5954,86 @@
                     </m:oMathParaPr>
                     <m:oMath xmlns:m="http://schemas.openxmlformats.org/officeDocument/2006/math">
                       <m:r>
-                        <a:rPr lang="en-US" i="1"/>
+                        <a:rPr lang="en-US" i="1">
+                          <a:latin typeface="Cambria Math"/>
+                        </a:rPr>
                         <m:t>𝑖𝑓</m:t>
                       </m:r>
                       <m:r>
-                        <a:rPr lang="en-US" i="1"/>
+                        <a:rPr lang="en-US" i="1">
+                          <a:latin typeface="Cambria Math"/>
+                        </a:rPr>
                         <m:t> </m:t>
                       </m:r>
                       <m:r>
-                        <a:rPr lang="en-US" i="1"/>
+                        <a:rPr lang="en-US" i="1">
+                          <a:latin typeface="Cambria Math"/>
+                        </a:rPr>
                         <m:t>𝑃</m:t>
                       </m:r>
                       <m:d>
                         <m:dPr>
                           <m:ctrlPr>
-                            <a:rPr lang="en-US" i="1"/>
+                            <a:rPr lang="en-US" i="1">
+                              <a:latin typeface="Cambria Math"/>
+                            </a:rPr>
                           </m:ctrlPr>
                         </m:dPr>
                         <m:e>
                           <m:r>
-                            <a:rPr lang="en-US" i="1"/>
+                            <a:rPr lang="en-US" i="1">
+                              <a:latin typeface="Cambria Math"/>
+                            </a:rPr>
                             <m:t>𝑚𝑒𝑠𝑠𝑎𝑔𝑒</m:t>
                           </m:r>
                           <m:r>
-                            <a:rPr lang="en-US" i="1"/>
+                            <a:rPr lang="en-US" i="1">
+                              <a:latin typeface="Cambria Math"/>
+                            </a:rPr>
                             <m:t> </m:t>
                           </m:r>
                           <m:r>
-                            <a:rPr lang="en-US" i="1"/>
+                            <a:rPr lang="en-US" i="1">
+                              <a:latin typeface="Cambria Math"/>
+                            </a:rPr>
                             <m:t>𝑖𝑠</m:t>
                           </m:r>
                           <m:r>
-                            <a:rPr lang="en-US" i="1"/>
+                            <a:rPr lang="en-US" i="1">
+                              <a:latin typeface="Cambria Math"/>
+                            </a:rPr>
                             <m:t> </m:t>
                           </m:r>
                           <m:r>
-                            <a:rPr lang="en-US" i="1"/>
+                            <a:rPr lang="en-US" i="1">
+                              <a:latin typeface="Cambria Math"/>
+                            </a:rPr>
                             <m:t>𝑠𝑝𝑎𝑚</m:t>
                           </m:r>
                         </m:e>
                       </m:d>
                       <m:r>
-                        <a:rPr lang="en-US" i="1"/>
+                        <a:rPr lang="en-US" i="1">
+                          <a:latin typeface="Cambria Math"/>
+                        </a:rPr>
                         <m:t>≥</m:t>
                       </m:r>
                       <m:r>
-                        <a:rPr lang="en-US" i="1"/>
+                        <a:rPr lang="en-US" i="1">
+                          <a:latin typeface="Cambria Math"/>
+                        </a:rPr>
                         <m:t>𝑡h𝑟𝑒𝑠h𝑜𝑙𝑑</m:t>
                       </m:r>
                       <m:r>
-                        <a:rPr lang="en-US" i="1"/>
+                        <a:rPr lang="en-US" i="1">
+                          <a:latin typeface="Cambria Math"/>
+                        </a:rPr>
                         <m:t>  → </m:t>
                       </m:r>
                       <m:r>
-                        <a:rPr lang="en-US" i="1"/>
+                        <a:rPr lang="en-US" i="1">
+                          <a:latin typeface="Cambria Math"/>
+                        </a:rPr>
                         <m:t>𝑠𝑝𝑎𝑚</m:t>
                       </m:r>
                     </m:oMath>
@@ -6785,7 +6044,7 @@
             </p:txBody>
           </p:sp>
         </mc:Choice>
-        <mc:Fallback>
+        <mc:Fallback xmlns="">
           <p:sp>
             <p:nvSpPr>
               <p:cNvPr id="4" name="Rectangle 3"/>
@@ -6844,7 +6103,7 @@
 </p:sld>
 </file>
 
-<file path=ppt/slides/slide15.xml><?xml version="1.0" encoding="utf-8"?>
+<file path=ppt/slides/slide13.xml><?xml version="1.0" encoding="utf-8"?>
 <p:sld xmlns:a="http://schemas.openxmlformats.org/drawingml/2006/main" xmlns:r="http://schemas.openxmlformats.org/officeDocument/2006/relationships" xmlns:p="http://schemas.openxmlformats.org/presentationml/2006/main">
   <p:cSld>
     <p:spTree>
@@ -6893,8 +6152,8 @@
           </a:p>
         </p:txBody>
       </p:sp>
-      <mc:AlternateContent xmlns:mc="http://schemas.openxmlformats.org/markup-compatibility/2006">
-        <mc:Choice xmlns:a14="http://schemas.microsoft.com/office/drawing/2010/main" Requires="a14">
+      <mc:AlternateContent xmlns:mc="http://schemas.openxmlformats.org/markup-compatibility/2006" xmlns:a14="http://schemas.microsoft.com/office/drawing/2010/main">
+        <mc:Choice Requires="a14">
           <p:sp>
             <p:nvSpPr>
               <p:cNvPr id="12" name="TextBox 11"/>
@@ -6978,7 +6237,7 @@
             </p:txBody>
           </p:sp>
         </mc:Choice>
-        <mc:Fallback>
+        <mc:Fallback xmlns="">
           <p:sp>
             <p:nvSpPr>
               <p:cNvPr id="12" name="TextBox 11"/>
@@ -7763,7 +7022,7 @@
 </p:sld>
 </file>
 
-<file path=ppt/slides/slide16.xml><?xml version="1.0" encoding="utf-8"?>
+<file path=ppt/slides/slide14.xml><?xml version="1.0" encoding="utf-8"?>
 <p:sld xmlns:a="http://schemas.openxmlformats.org/drawingml/2006/main" xmlns:r="http://schemas.openxmlformats.org/officeDocument/2006/relationships" xmlns:p="http://schemas.openxmlformats.org/presentationml/2006/main">
   <p:cSld>
     <p:spTree>
@@ -7780,15 +7039,32 @@
           <a:chExt cx="0" cy="0"/>
         </a:xfrm>
       </p:grpSpPr>
-      <p:pic>
-        <p:nvPicPr>
-          <p:cNvPr id="3074" name="Picture 2" descr="C:\Users\Noah\Desktop\ignoring_headers_full.PNG"/>
-          <p:cNvPicPr>
-            <a:picLocks noGrp="1" noChangeAspect="1" noChangeArrowheads="1"/>
-          </p:cNvPicPr>
+      <p:sp>
+        <p:nvSpPr>
+          <p:cNvPr id="2" name="Content Placeholder 1"/>
+          <p:cNvSpPr>
+            <a:spLocks noGrp="1"/>
+          </p:cNvSpPr>
           <p:nvPr>
             <p:ph idx="1"/>
           </p:nvPr>
+        </p:nvSpPr>
+        <p:spPr/>
+        <p:txBody>
+          <a:bodyPr/>
+          <a:lstStyle/>
+          <a:p>
+            <a:endParaRPr lang="en-US"/>
+          </a:p>
+        </p:txBody>
+      </p:sp>
+      <p:pic>
+        <p:nvPicPr>
+          <p:cNvPr id="2050" name="Picture 2" descr="C:\Users\Noah\Copy\Documents\GitHub\PySpamFilter\documents\ignoring_headers_full.PNG"/>
+          <p:cNvPicPr>
+            <a:picLocks noChangeAspect="1" noChangeArrowheads="1"/>
+          </p:cNvPicPr>
+          <p:nvPr/>
         </p:nvPicPr>
         <p:blipFill>
           <a:blip r:embed="rId2">
@@ -7805,8 +7081,8 @@
         </p:blipFill>
         <p:spPr bwMode="auto">
           <a:xfrm>
-            <a:off x="228600" y="0"/>
-            <a:ext cx="8641584" cy="6858000"/>
+            <a:off x="119336" y="-1"/>
+            <a:ext cx="8901681" cy="6858001"/>
           </a:xfrm>
           <a:prstGeom prst="rect">
             <a:avLst/>
@@ -7843,7 +7119,7 @@
 </p:sld>
 </file>
 
-<file path=ppt/slides/slide17.xml><?xml version="1.0" encoding="utf-8"?>
+<file path=ppt/slides/slide15.xml><?xml version="1.0" encoding="utf-8"?>
 <p:sld xmlns:a="http://schemas.openxmlformats.org/drawingml/2006/main" xmlns:r="http://schemas.openxmlformats.org/officeDocument/2006/relationships" xmlns:p="http://schemas.openxmlformats.org/presentationml/2006/main">
   <p:cSld>
     <p:spTree>
@@ -7903,6 +7179,47 @@
           </a:extLst>
         </p:spPr>
       </p:pic>
+      <p:pic>
+        <p:nvPicPr>
+          <p:cNvPr id="3074" name="Picture 2" descr="C:\Users\Noah\Copy\Documents\GitHub\PySpamFilter\documents\considering_headers_full.PNG"/>
+          <p:cNvPicPr>
+            <a:picLocks noChangeAspect="1" noChangeArrowheads="1"/>
+          </p:cNvPicPr>
+          <p:nvPr/>
+        </p:nvPicPr>
+        <p:blipFill>
+          <a:blip r:embed="rId3">
+            <a:extLst>
+              <a:ext uri="{28A0092B-C50C-407E-A947-70E740481C1C}">
+                <a14:useLocalDpi xmlns:a14="http://schemas.microsoft.com/office/drawing/2010/main" val="0"/>
+              </a:ext>
+            </a:extLst>
+          </a:blip>
+          <a:srcRect/>
+          <a:stretch>
+            <a:fillRect/>
+          </a:stretch>
+        </p:blipFill>
+        <p:spPr bwMode="auto">
+          <a:xfrm>
+            <a:off x="150126" y="-4763"/>
+            <a:ext cx="8842162" cy="6867526"/>
+          </a:xfrm>
+          <a:prstGeom prst="rect">
+            <a:avLst/>
+          </a:prstGeom>
+          <a:noFill/>
+          <a:extLst>
+            <a:ext uri="{909E8E84-426E-40DD-AFC4-6F175D3DCCD1}">
+              <a14:hiddenFill xmlns:a14="http://schemas.microsoft.com/office/drawing/2010/main">
+                <a:solidFill>
+                  <a:srgbClr val="FFFFFF"/>
+                </a:solidFill>
+              </a14:hiddenFill>
+            </a:ext>
+          </a:extLst>
+        </p:spPr>
+      </p:pic>
     </p:spTree>
     <p:extLst>
       <p:ext uri="{BB962C8B-B14F-4D97-AF65-F5344CB8AC3E}">
@@ -7923,7 +7240,7 @@
 </p:sld>
 </file>
 
-<file path=ppt/slides/slide18.xml><?xml version="1.0" encoding="utf-8"?>
+<file path=ppt/slides/slide16.xml><?xml version="1.0" encoding="utf-8"?>
 <p:sld xmlns:a="http://schemas.openxmlformats.org/drawingml/2006/main" xmlns:r="http://schemas.openxmlformats.org/officeDocument/2006/relationships" xmlns:p="http://schemas.openxmlformats.org/presentationml/2006/main">
   <p:cSld>
     <p:spTree>
@@ -7993,7 +7310,7 @@
 </p:sld>
 </file>
 
-<file path=ppt/slides/slide2.xml><?xml version="1.0" encoding="utf-8"?>
+<file path=ppt/slides/slide17.xml><?xml version="1.0" encoding="utf-8"?>
 <p:sld xmlns:a="http://schemas.openxmlformats.org/drawingml/2006/main" xmlns:r="http://schemas.openxmlformats.org/officeDocument/2006/relationships" xmlns:p="http://schemas.openxmlformats.org/presentationml/2006/main">
   <p:cSld>
     <p:spTree>
@@ -8012,7 +7329,7 @@
       </p:grpSpPr>
       <p:sp>
         <p:nvSpPr>
-          <p:cNvPr id="3" name="Content Placeholder 2"/>
+          <p:cNvPr id="4" name="Content Placeholder 2"/>
           <p:cNvSpPr>
             <a:spLocks noGrp="1"/>
           </p:cNvSpPr>
@@ -8022,13 +7339,13 @@
         </p:nvSpPr>
         <p:spPr>
           <a:xfrm>
-            <a:off x="3051465" y="2840180"/>
-            <a:ext cx="3041070" cy="1177640"/>
+            <a:off x="1295400" y="3124200"/>
+            <a:ext cx="6553200" cy="609600"/>
           </a:xfrm>
         </p:spPr>
         <p:txBody>
           <a:bodyPr>
-            <a:noAutofit/>
+            <a:normAutofit/>
           </a:bodyPr>
           <a:lstStyle/>
           <a:p>
@@ -8037,18 +7354,234 @@
             </a:pPr>
             <a:r>
               <a:rPr lang="en-US" dirty="0" smtClean="0"/>
+              <a:t>Demo!</a:t>
+            </a:r>
+            <a:endParaRPr lang="en-US" dirty="0"/>
+          </a:p>
+        </p:txBody>
+      </p:sp>
+      <p:pic>
+        <p:nvPicPr>
+          <p:cNvPr id="4098" name="Picture 2" descr="http://ece.umass.edu/sites/default/files/imagecache/faculty150/parente_0.jpg"/>
+          <p:cNvPicPr>
+            <a:picLocks noChangeAspect="1" noChangeArrowheads="1"/>
+          </p:cNvPicPr>
+          <p:nvPr/>
+        </p:nvPicPr>
+        <p:blipFill>
+          <a:blip r:embed="rId2">
+            <a:extLst>
+              <a:ext uri="{28A0092B-C50C-407E-A947-70E740481C1C}">
+                <a14:useLocalDpi xmlns:a14="http://schemas.microsoft.com/office/drawing/2010/main" val="0"/>
+              </a:ext>
+            </a:extLst>
+          </a:blip>
+          <a:srcRect/>
+          <a:stretch>
+            <a:fillRect/>
+          </a:stretch>
+        </p:blipFill>
+        <p:spPr bwMode="auto">
+          <a:xfrm>
+            <a:off x="125247" y="5257800"/>
+            <a:ext cx="1428750" cy="1428750"/>
+          </a:xfrm>
+          <a:prstGeom prst="rect">
+            <a:avLst/>
+          </a:prstGeom>
+          <a:noFill/>
+          <a:extLst>
+            <a:ext uri="{909E8E84-426E-40DD-AFC4-6F175D3DCCD1}">
+              <a14:hiddenFill xmlns:a14="http://schemas.microsoft.com/office/drawing/2010/main">
+                <a:solidFill>
+                  <a:srgbClr val="FFFFFF"/>
+                </a:solidFill>
+              </a14:hiddenFill>
+            </a:ext>
+          </a:extLst>
+        </p:spPr>
+      </p:pic>
+    </p:spTree>
+    <p:extLst>
+      <p:ext uri="{BB962C8B-B14F-4D97-AF65-F5344CB8AC3E}">
+        <p14:creationId xmlns:p14="http://schemas.microsoft.com/office/powerpoint/2010/main" val="474782251"/>
+      </p:ext>
+    </p:extLst>
+  </p:cSld>
+  <p:clrMapOvr>
+    <a:masterClrMapping/>
+  </p:clrMapOvr>
+  <p:timing>
+    <p:tnLst>
+      <p:par>
+        <p:cTn id="1" dur="indefinite" restart="never" nodeType="tmRoot"/>
+      </p:par>
+    </p:tnLst>
+  </p:timing>
+</p:sld>
+</file>
+
+<file path=ppt/slides/slide2.xml><?xml version="1.0" encoding="utf-8"?>
+<p:sld xmlns:a="http://schemas.openxmlformats.org/drawingml/2006/main" xmlns:r="http://schemas.openxmlformats.org/officeDocument/2006/relationships" xmlns:p="http://schemas.openxmlformats.org/presentationml/2006/main">
+  <p:cSld>
+    <p:spTree>
+      <p:nvGrpSpPr>
+        <p:cNvPr id="1" name=""/>
+        <p:cNvGrpSpPr/>
+        <p:nvPr/>
+      </p:nvGrpSpPr>
+      <p:grpSpPr>
+        <a:xfrm>
+          <a:off x="0" y="0"/>
+          <a:ext cx="0" cy="0"/>
+          <a:chOff x="0" y="0"/>
+          <a:chExt cx="0" cy="0"/>
+        </a:xfrm>
+      </p:grpSpPr>
+      <p:pic>
+        <p:nvPicPr>
+          <p:cNvPr id="1026" name="Picture 2" descr="http://www.digitalruby.com/wp-content/uploads/2013/10/Spam-Can.jpg"/>
+          <p:cNvPicPr>
+            <a:picLocks noChangeAspect="1" noChangeArrowheads="1"/>
+          </p:cNvPicPr>
+          <p:nvPr/>
+        </p:nvPicPr>
+        <p:blipFill>
+          <a:blip r:embed="rId2" cstate="print">
+            <a:extLst>
+              <a:ext uri="{28A0092B-C50C-407E-A947-70E740481C1C}">
+                <a14:useLocalDpi xmlns:a14="http://schemas.microsoft.com/office/drawing/2010/main" val="0"/>
+              </a:ext>
+            </a:extLst>
+          </a:blip>
+          <a:srcRect/>
+          <a:stretch>
+            <a:fillRect/>
+          </a:stretch>
+        </p:blipFill>
+        <p:spPr bwMode="auto">
+          <a:xfrm>
+            <a:off x="914400" y="2439258"/>
+            <a:ext cx="3186113" cy="3128963"/>
+          </a:xfrm>
+          <a:prstGeom prst="rect">
+            <a:avLst/>
+          </a:prstGeom>
+          <a:noFill/>
+          <a:extLst>
+            <a:ext uri="{909E8E84-426E-40DD-AFC4-6F175D3DCCD1}">
+              <a14:hiddenFill xmlns:a14="http://schemas.microsoft.com/office/drawing/2010/main">
+                <a:solidFill>
+                  <a:srgbClr val="FFFFFF"/>
+                </a:solidFill>
+              </a14:hiddenFill>
+            </a:ext>
+          </a:extLst>
+        </p:spPr>
+      </p:pic>
+      <p:sp>
+        <p:nvSpPr>
+          <p:cNvPr id="2" name="TextBox 1"/>
+          <p:cNvSpPr txBox="1"/>
+          <p:nvPr/>
+        </p:nvSpPr>
+        <p:spPr>
+          <a:xfrm>
+            <a:off x="1103194" y="1518160"/>
+            <a:ext cx="3186113" cy="1384995"/>
+          </a:xfrm>
+          <a:prstGeom prst="rect">
+            <a:avLst/>
+          </a:prstGeom>
+          <a:noFill/>
+        </p:spPr>
+        <p:txBody>
+          <a:bodyPr wrap="square" rtlCol="0">
+            <a:spAutoFit/>
+          </a:bodyPr>
+          <a:lstStyle/>
+          <a:p>
+            <a:r>
+              <a:rPr lang="en-US" sz="4200" dirty="0"/>
               <a:t>Spam is bad</a:t>
             </a:r>
           </a:p>
           <a:p>
-            <a:pPr marL="0" indent="0" algn="ctr">
-              <a:buNone/>
-            </a:pPr>
-            <a:r>
-              <a:rPr lang="en-US" dirty="0" smtClean="0"/>
+            <a:endParaRPr lang="en-US" sz="4200" dirty="0"/>
+          </a:p>
+        </p:txBody>
+      </p:sp>
+      <p:pic>
+        <p:nvPicPr>
+          <p:cNvPr id="1028" name="Picture 4" descr="http://www.tucsonweekly.com/images/blogimages/2011/03/01/1299024885-ham.png"/>
+          <p:cNvPicPr>
+            <a:picLocks noChangeAspect="1" noChangeArrowheads="1"/>
+          </p:cNvPicPr>
+          <p:nvPr/>
+        </p:nvPicPr>
+        <p:blipFill>
+          <a:blip r:embed="rId3">
+            <a:extLst>
+              <a:ext uri="{28A0092B-C50C-407E-A947-70E740481C1C}">
+                <a14:useLocalDpi xmlns:a14="http://schemas.microsoft.com/office/drawing/2010/main" val="0"/>
+              </a:ext>
+            </a:extLst>
+          </a:blip>
+          <a:srcRect/>
+          <a:stretch>
+            <a:fillRect/>
+          </a:stretch>
+        </p:blipFill>
+        <p:spPr bwMode="auto">
+          <a:xfrm>
+            <a:off x="5029199" y="2294001"/>
+            <a:ext cx="3771396" cy="3573399"/>
+          </a:xfrm>
+          <a:prstGeom prst="rect">
+            <a:avLst/>
+          </a:prstGeom>
+          <a:noFill/>
+          <a:extLst>
+            <a:ext uri="{909E8E84-426E-40DD-AFC4-6F175D3DCCD1}">
+              <a14:hiddenFill xmlns:a14="http://schemas.microsoft.com/office/drawing/2010/main">
+                <a:solidFill>
+                  <a:srgbClr val="FFFFFF"/>
+                </a:solidFill>
+              </a14:hiddenFill>
+            </a:ext>
+          </a:extLst>
+        </p:spPr>
+      </p:pic>
+      <p:sp>
+        <p:nvSpPr>
+          <p:cNvPr id="6" name="TextBox 5"/>
+          <p:cNvSpPr txBox="1"/>
+          <p:nvPr/>
+        </p:nvSpPr>
+        <p:spPr>
+          <a:xfrm>
+            <a:off x="5321841" y="1522923"/>
+            <a:ext cx="3186113" cy="1384995"/>
+          </a:xfrm>
+          <a:prstGeom prst="rect">
+            <a:avLst/>
+          </a:prstGeom>
+          <a:noFill/>
+        </p:spPr>
+        <p:txBody>
+          <a:bodyPr wrap="square" rtlCol="0">
+            <a:spAutoFit/>
+          </a:bodyPr>
+          <a:lstStyle/>
+          <a:p>
+            <a:r>
+              <a:rPr lang="en-US" sz="4200" dirty="0" smtClean="0"/>
               <a:t>Ham is good</a:t>
             </a:r>
-            <a:endParaRPr lang="en-US" dirty="0"/>
+            <a:endParaRPr lang="en-US" sz="4200" dirty="0"/>
+          </a:p>
+          <a:p>
+            <a:endParaRPr lang="en-US" sz="4200" dirty="0"/>
           </a:p>
         </p:txBody>
       </p:sp>
@@ -8110,13 +7643,7 @@
               <a:rPr lang="en-US" sz="3200" dirty="0" smtClean="0">
                 <a:latin typeface="+mn-lt"/>
               </a:rPr>
-              <a:t>How do we </a:t>
-            </a:r>
-            <a:r>
-              <a:rPr lang="en-US" sz="3200" dirty="0" smtClean="0">
-                <a:latin typeface="+mn-lt"/>
-              </a:rPr>
-              <a:t>detect this as spam?</a:t>
+              <a:t>How do we detect this as spam?</a:t>
             </a:r>
             <a:endParaRPr lang="en-US" sz="3200" dirty="0">
               <a:latin typeface="+mn-lt"/>
@@ -8589,7 +8116,6 @@
               <a:rPr lang="en-US" sz="3200" dirty="0"/>
               <a:t>How do we detect this as spam?</a:t>
             </a:r>
-            <a:endParaRPr lang="en-US" sz="3200" dirty="0"/>
           </a:p>
         </p:txBody>
       </p:sp>
@@ -9563,527 +9089,6 @@
           <a:chExt cx="0" cy="0"/>
         </a:xfrm>
       </p:grpSpPr>
-      <p:graphicFrame>
-        <p:nvGraphicFramePr>
-          <p:cNvPr id="4" name="Table 3"/>
-          <p:cNvGraphicFramePr>
-            <a:graphicFrameLocks noGrp="1"/>
-          </p:cNvGraphicFramePr>
-          <p:nvPr>
-            <p:extLst>
-              <p:ext uri="{D42A27DB-BD31-4B8C-83A1-F6EECF244321}">
-                <p14:modId xmlns:p14="http://schemas.microsoft.com/office/powerpoint/2010/main" val="3343757307"/>
-              </p:ext>
-            </p:extLst>
-          </p:nvPr>
-        </p:nvGraphicFramePr>
-        <p:xfrm>
-          <a:off x="1168400" y="1440180"/>
-          <a:ext cx="6807200" cy="3977640"/>
-        </p:xfrm>
-        <a:graphic>
-          <a:graphicData uri="http://schemas.openxmlformats.org/drawingml/2006/table">
-            <a:tbl>
-              <a:tblPr firstRow="1" bandRow="1">
-                <a:tableStyleId>{5940675A-B579-460E-94D1-54222C63F5DA}</a:tableStyleId>
-              </a:tblPr>
-              <a:tblGrid>
-                <a:gridCol w="2743200"/>
-                <a:gridCol w="2032000"/>
-                <a:gridCol w="2032000"/>
-              </a:tblGrid>
-              <a:tr h="370840">
-                <a:tc>
-                  <a:txBody>
-                    <a:bodyPr/>
-                    <a:lstStyle/>
-                    <a:p>
-                      <a:r>
-                        <a:rPr lang="en-US" b="1" dirty="0" smtClean="0"/>
-                        <a:t>word</a:t>
-                      </a:r>
-                      <a:endParaRPr lang="en-US" b="1" dirty="0"/>
-                    </a:p>
-                  </a:txBody>
-                  <a:tcPr/>
-                </a:tc>
-                <a:tc>
-                  <a:txBody>
-                    <a:bodyPr/>
-                    <a:lstStyle/>
-                    <a:p>
-                      <a:r>
-                        <a:rPr lang="en-US" b="1" dirty="0" smtClean="0"/>
-                        <a:t>frequency in</a:t>
-                      </a:r>
-                    </a:p>
-                    <a:p>
-                      <a:r>
-                        <a:rPr lang="en-US" b="1" dirty="0" smtClean="0"/>
-                        <a:t>spam corpus</a:t>
-                      </a:r>
-                      <a:endParaRPr lang="en-US" b="1" dirty="0"/>
-                    </a:p>
-                  </a:txBody>
-                  <a:tcPr/>
-                </a:tc>
-                <a:tc>
-                  <a:txBody>
-                    <a:bodyPr/>
-                    <a:lstStyle/>
-                    <a:p>
-                      <a:r>
-                        <a:rPr lang="en-US" b="1" dirty="0" smtClean="0"/>
-                        <a:t>frequency in</a:t>
-                      </a:r>
-                    </a:p>
-                    <a:p>
-                      <a:r>
-                        <a:rPr lang="en-US" b="1" dirty="0" smtClean="0"/>
-                        <a:t>ham corpus</a:t>
-                      </a:r>
-                      <a:endParaRPr lang="en-US" b="1" dirty="0"/>
-                    </a:p>
-                  </a:txBody>
-                  <a:tcPr/>
-                </a:tc>
-              </a:tr>
-              <a:tr h="370840">
-                <a:tc>
-                  <a:txBody>
-                    <a:bodyPr/>
-                    <a:lstStyle/>
-                    <a:p>
-                      <a:r>
-                        <a:rPr lang="en-US" dirty="0" smtClean="0"/>
-                        <a:t>hello</a:t>
-                      </a:r>
-                    </a:p>
-                  </a:txBody>
-                  <a:tcPr/>
-                </a:tc>
-                <a:tc>
-                  <a:txBody>
-                    <a:bodyPr/>
-                    <a:lstStyle/>
-                    <a:p>
-                      <a:r>
-                        <a:rPr lang="en-US" dirty="0" smtClean="0"/>
-                        <a:t>53</a:t>
-                      </a:r>
-                      <a:endParaRPr lang="en-US" dirty="0"/>
-                    </a:p>
-                  </a:txBody>
-                  <a:tcPr/>
-                </a:tc>
-                <a:tc>
-                  <a:txBody>
-                    <a:bodyPr/>
-                    <a:lstStyle/>
-                    <a:p>
-                      <a:r>
-                        <a:rPr lang="en-US" dirty="0" smtClean="0"/>
-                        <a:t>28</a:t>
-                      </a:r>
-                      <a:endParaRPr lang="en-US" dirty="0"/>
-                    </a:p>
-                  </a:txBody>
-                  <a:tcPr/>
-                </a:tc>
-              </a:tr>
-              <a:tr h="370840">
-                <a:tc>
-                  <a:txBody>
-                    <a:bodyPr/>
-                    <a:lstStyle/>
-                    <a:p>
-                      <a:pPr marL="0" indent="0">
-                        <a:buNone/>
-                      </a:pPr>
-                      <a:r>
-                        <a:rPr lang="en-US" dirty="0" smtClean="0"/>
-                        <a:t>free</a:t>
-                      </a:r>
-                    </a:p>
-                  </a:txBody>
-                  <a:tcPr/>
-                </a:tc>
-                <a:tc>
-                  <a:txBody>
-                    <a:bodyPr/>
-                    <a:lstStyle/>
-                    <a:p>
-                      <a:r>
-                        <a:rPr lang="en-US" dirty="0" smtClean="0"/>
-                        <a:t>1625</a:t>
-                      </a:r>
-                      <a:endParaRPr lang="en-US" dirty="0"/>
-                    </a:p>
-                  </a:txBody>
-                  <a:tcPr/>
-                </a:tc>
-                <a:tc>
-                  <a:txBody>
-                    <a:bodyPr/>
-                    <a:lstStyle/>
-                    <a:p>
-                      <a:r>
-                        <a:rPr lang="en-US" dirty="0" smtClean="0"/>
-                        <a:t>158</a:t>
-                      </a:r>
-                      <a:endParaRPr lang="en-US" dirty="0"/>
-                    </a:p>
-                  </a:txBody>
-                  <a:tcPr/>
-                </a:tc>
-              </a:tr>
-              <a:tr h="370840">
-                <a:tc>
-                  <a:txBody>
-                    <a:bodyPr/>
-                    <a:lstStyle/>
-                    <a:p>
-                      <a:r>
-                        <a:rPr lang="en-US" dirty="0" smtClean="0"/>
-                        <a:t>thanks</a:t>
-                      </a:r>
-                    </a:p>
-                  </a:txBody>
-                  <a:tcPr/>
-                </a:tc>
-                <a:tc>
-                  <a:txBody>
-                    <a:bodyPr/>
-                    <a:lstStyle/>
-                    <a:p>
-                      <a:r>
-                        <a:rPr lang="en-US" dirty="0" smtClean="0"/>
-                        <a:t>67</a:t>
-                      </a:r>
-                      <a:endParaRPr lang="en-US" dirty="0"/>
-                    </a:p>
-                  </a:txBody>
-                  <a:tcPr/>
-                </a:tc>
-                <a:tc>
-                  <a:txBody>
-                    <a:bodyPr/>
-                    <a:lstStyle/>
-                    <a:p>
-                      <a:r>
-                        <a:rPr lang="en-US" dirty="0" smtClean="0"/>
-                        <a:t>135</a:t>
-                      </a:r>
-                      <a:endParaRPr lang="en-US" dirty="0"/>
-                    </a:p>
-                  </a:txBody>
-                  <a:tcPr/>
-                </a:tc>
-              </a:tr>
-              <a:tr h="370840">
-                <a:tc>
-                  <a:txBody>
-                    <a:bodyPr/>
-                    <a:lstStyle/>
-                    <a:p>
-                      <a:r>
-                        <a:rPr lang="en-US" dirty="0" smtClean="0"/>
-                        <a:t>friend</a:t>
-                      </a:r>
-                    </a:p>
-                  </a:txBody>
-                  <a:tcPr/>
-                </a:tc>
-                <a:tc>
-                  <a:txBody>
-                    <a:bodyPr/>
-                    <a:lstStyle/>
-                    <a:p>
-                      <a:r>
-                        <a:rPr lang="en-US" dirty="0" smtClean="0"/>
-                        <a:t>79</a:t>
-                      </a:r>
-                      <a:endParaRPr lang="en-US" dirty="0"/>
-                    </a:p>
-                  </a:txBody>
-                  <a:tcPr/>
-                </a:tc>
-                <a:tc>
-                  <a:txBody>
-                    <a:bodyPr/>
-                    <a:lstStyle/>
-                    <a:p>
-                      <a:r>
-                        <a:rPr lang="en-US" dirty="0" smtClean="0"/>
-                        <a:t>31</a:t>
-                      </a:r>
-                      <a:endParaRPr lang="en-US" dirty="0"/>
-                    </a:p>
-                  </a:txBody>
-                  <a:tcPr/>
-                </a:tc>
-              </a:tr>
-              <a:tr h="370840">
-                <a:tc>
-                  <a:txBody>
-                    <a:bodyPr/>
-                    <a:lstStyle/>
-                    <a:p>
-                      <a:r>
-                        <a:rPr lang="en-US" dirty="0" smtClean="0"/>
-                        <a:t>click</a:t>
-                      </a:r>
-                      <a:endParaRPr lang="en-US" dirty="0"/>
-                    </a:p>
-                  </a:txBody>
-                  <a:tcPr/>
-                </a:tc>
-                <a:tc>
-                  <a:txBody>
-                    <a:bodyPr/>
-                    <a:lstStyle/>
-                    <a:p>
-                      <a:r>
-                        <a:rPr lang="en-US" dirty="0" smtClean="0"/>
-                        <a:t>1354</a:t>
-                      </a:r>
-                      <a:endParaRPr lang="en-US" dirty="0"/>
-                    </a:p>
-                  </a:txBody>
-                  <a:tcPr/>
-                </a:tc>
-                <a:tc>
-                  <a:txBody>
-                    <a:bodyPr/>
-                    <a:lstStyle/>
-                    <a:p>
-                      <a:r>
-                        <a:rPr lang="en-US" dirty="0" smtClean="0"/>
-                        <a:t>23</a:t>
-                      </a:r>
-                      <a:endParaRPr lang="en-US" dirty="0"/>
-                    </a:p>
-                  </a:txBody>
-                  <a:tcPr/>
-                </a:tc>
-              </a:tr>
-              <a:tr h="370840">
-                <a:tc>
-                  <a:txBody>
-                    <a:bodyPr/>
-                    <a:lstStyle/>
-                    <a:p>
-                      <a:r>
-                        <a:rPr lang="en-US" dirty="0" err="1" smtClean="0"/>
-                        <a:t>nigeria</a:t>
-                      </a:r>
-                      <a:endParaRPr lang="en-US" dirty="0"/>
-                    </a:p>
-                  </a:txBody>
-                  <a:tcPr/>
-                </a:tc>
-                <a:tc>
-                  <a:txBody>
-                    <a:bodyPr/>
-                    <a:lstStyle/>
-                    <a:p>
-                      <a:r>
-                        <a:rPr lang="en-US" dirty="0" smtClean="0"/>
-                        <a:t>58</a:t>
-                      </a:r>
-                      <a:endParaRPr lang="en-US" dirty="0"/>
-                    </a:p>
-                  </a:txBody>
-                  <a:tcPr/>
-                </a:tc>
-                <a:tc>
-                  <a:txBody>
-                    <a:bodyPr/>
-                    <a:lstStyle/>
-                    <a:p>
-                      <a:r>
-                        <a:rPr lang="en-US" dirty="0" smtClean="0"/>
-                        <a:t>7</a:t>
-                      </a:r>
-                      <a:endParaRPr lang="en-US" dirty="0"/>
-                    </a:p>
-                  </a:txBody>
-                  <a:tcPr/>
-                </a:tc>
-              </a:tr>
-              <a:tr h="370840">
-                <a:tc>
-                  <a:txBody>
-                    <a:bodyPr/>
-                    <a:lstStyle/>
-                    <a:p>
-                      <a:r>
-                        <a:rPr lang="en-US" dirty="0" smtClean="0"/>
-                        <a:t>hey</a:t>
-                      </a:r>
-                      <a:endParaRPr lang="en-US" dirty="0"/>
-                    </a:p>
-                  </a:txBody>
-                  <a:tcPr/>
-                </a:tc>
-                <a:tc>
-                  <a:txBody>
-                    <a:bodyPr/>
-                    <a:lstStyle/>
-                    <a:p>
-                      <a:r>
-                        <a:rPr lang="en-US" dirty="0" smtClean="0"/>
-                        <a:t>13</a:t>
-                      </a:r>
-                      <a:endParaRPr lang="en-US" dirty="0"/>
-                    </a:p>
-                  </a:txBody>
-                  <a:tcPr/>
-                </a:tc>
-                <a:tc>
-                  <a:txBody>
-                    <a:bodyPr/>
-                    <a:lstStyle/>
-                    <a:p>
-                      <a:r>
-                        <a:rPr lang="en-US" dirty="0" smtClean="0"/>
-                        <a:t>21</a:t>
-                      </a:r>
-                      <a:endParaRPr lang="en-US" dirty="0"/>
-                    </a:p>
-                  </a:txBody>
-                  <a:tcPr/>
-                </a:tc>
-              </a:tr>
-              <a:tr h="370840">
-                <a:tc>
-                  <a:txBody>
-                    <a:bodyPr/>
-                    <a:lstStyle/>
-                    <a:p>
-                      <a:r>
-                        <a:rPr lang="en-US" dirty="0" smtClean="0"/>
-                        <a:t>sir</a:t>
-                      </a:r>
-                      <a:endParaRPr lang="en-US" dirty="0"/>
-                    </a:p>
-                  </a:txBody>
-                  <a:tcPr/>
-                </a:tc>
-                <a:tc>
-                  <a:txBody>
-                    <a:bodyPr/>
-                    <a:lstStyle/>
-                    <a:p>
-                      <a:r>
-                        <a:rPr lang="en-US" dirty="0" smtClean="0"/>
-                        <a:t>32</a:t>
-                      </a:r>
-                      <a:endParaRPr lang="en-US" dirty="0"/>
-                    </a:p>
-                  </a:txBody>
-                  <a:tcPr/>
-                </a:tc>
-                <a:tc>
-                  <a:txBody>
-                    <a:bodyPr/>
-                    <a:lstStyle/>
-                    <a:p>
-                      <a:r>
-                        <a:rPr lang="en-US" dirty="0" smtClean="0"/>
-                        <a:t>7</a:t>
-                      </a:r>
-                      <a:endParaRPr lang="en-US" dirty="0"/>
-                    </a:p>
-                  </a:txBody>
-                  <a:tcPr/>
-                </a:tc>
-              </a:tr>
-              <a:tr h="370840">
-                <a:tc>
-                  <a:txBody>
-                    <a:bodyPr/>
-                    <a:lstStyle/>
-                    <a:p>
-                      <a:r>
-                        <a:rPr lang="en-US" dirty="0" smtClean="0"/>
-                        <a:t>sales</a:t>
-                      </a:r>
-                      <a:endParaRPr lang="en-US" dirty="0"/>
-                    </a:p>
-                  </a:txBody>
-                  <a:tcPr/>
-                </a:tc>
-                <a:tc>
-                  <a:txBody>
-                    <a:bodyPr/>
-                    <a:lstStyle/>
-                    <a:p>
-                      <a:r>
-                        <a:rPr lang="en-US" dirty="0" smtClean="0"/>
-                        <a:t>225</a:t>
-                      </a:r>
-                      <a:endParaRPr lang="en-US" dirty="0"/>
-                    </a:p>
-                  </a:txBody>
-                  <a:tcPr/>
-                </a:tc>
-                <a:tc>
-                  <a:txBody>
-                    <a:bodyPr/>
-                    <a:lstStyle/>
-                    <a:p>
-                      <a:r>
-                        <a:rPr lang="en-US" dirty="0" smtClean="0"/>
-                        <a:t>7</a:t>
-                      </a:r>
-                      <a:endParaRPr lang="en-US" dirty="0"/>
-                    </a:p>
-                  </a:txBody>
-                  <a:tcPr/>
-                </a:tc>
-              </a:tr>
-            </a:tbl>
-          </a:graphicData>
-        </a:graphic>
-      </p:graphicFrame>
-    </p:spTree>
-    <p:extLst>
-      <p:ext uri="{BB962C8B-B14F-4D97-AF65-F5344CB8AC3E}">
-        <p14:creationId xmlns:p14="http://schemas.microsoft.com/office/powerpoint/2010/main" val="3311635578"/>
-      </p:ext>
-    </p:extLst>
-  </p:cSld>
-  <p:clrMapOvr>
-    <a:masterClrMapping/>
-  </p:clrMapOvr>
-  <p:timing>
-    <p:tnLst>
-      <p:par>
-        <p:cTn id="1" dur="indefinite" restart="never" nodeType="tmRoot"/>
-      </p:par>
-    </p:tnLst>
-  </p:timing>
-</p:sld>
-</file>
-
-<file path=ppt/slides/slide8.xml><?xml version="1.0" encoding="utf-8"?>
-<p:sld xmlns:a="http://schemas.openxmlformats.org/drawingml/2006/main" xmlns:r="http://schemas.openxmlformats.org/officeDocument/2006/relationships" xmlns:p="http://schemas.openxmlformats.org/presentationml/2006/main">
-  <p:cSld>
-    <p:spTree>
-      <p:nvGrpSpPr>
-        <p:cNvPr id="1" name=""/>
-        <p:cNvGrpSpPr/>
-        <p:nvPr/>
-      </p:nvGrpSpPr>
-      <p:grpSpPr>
-        <a:xfrm>
-          <a:off x="0" y="0"/>
-          <a:ext cx="0" cy="0"/>
-          <a:chOff x="0" y="0"/>
-          <a:chExt cx="0" cy="0"/>
-        </a:xfrm>
-      </p:grpSpPr>
       <p:sp>
         <p:nvSpPr>
           <p:cNvPr id="2" name="Title 1"/>
@@ -10109,8 +9114,8 @@
           </a:p>
         </p:txBody>
       </p:sp>
-      <mc:AlternateContent xmlns:mc="http://schemas.openxmlformats.org/markup-compatibility/2006">
-        <mc:Choice xmlns:a14="http://schemas.microsoft.com/office/drawing/2010/main" Requires="a14">
+      <mc:AlternateContent xmlns:mc="http://schemas.openxmlformats.org/markup-compatibility/2006" xmlns:a14="http://schemas.microsoft.com/office/drawing/2010/main">
+        <mc:Choice Requires="a14">
           <p:sp>
             <p:nvSpPr>
               <p:cNvPr id="4" name="Rectangle 3"/>
@@ -10296,7 +9301,7 @@
             </p:txBody>
           </p:sp>
         </mc:Choice>
-        <mc:Fallback>
+        <mc:Fallback xmlns="">
           <p:sp>
             <p:nvSpPr>
               <p:cNvPr id="4" name="Rectangle 3"/>
@@ -10355,7 +9360,7 @@
 </p:sld>
 </file>
 
-<file path=ppt/slides/slide9.xml><?xml version="1.0" encoding="utf-8"?>
+<file path=ppt/slides/slide8.xml><?xml version="1.0" encoding="utf-8"?>
 <p:sld xmlns:a="http://schemas.openxmlformats.org/drawingml/2006/main" xmlns:r="http://schemas.openxmlformats.org/officeDocument/2006/relationships" xmlns:p="http://schemas.openxmlformats.org/presentationml/2006/main">
   <p:cSld>
     <p:spTree>
@@ -11007,6 +10012,74 @@
     <p:extLst>
       <p:ext uri="{BB962C8B-B14F-4D97-AF65-F5344CB8AC3E}">
         <p14:creationId xmlns:p14="http://schemas.microsoft.com/office/powerpoint/2010/main" val="3186525235"/>
+      </p:ext>
+    </p:extLst>
+  </p:cSld>
+  <p:clrMapOvr>
+    <a:masterClrMapping/>
+  </p:clrMapOvr>
+  <p:timing>
+    <p:tnLst>
+      <p:par>
+        <p:cTn id="1" dur="indefinite" restart="never" nodeType="tmRoot"/>
+      </p:par>
+    </p:tnLst>
+  </p:timing>
+</p:sld>
+</file>
+
+<file path=ppt/slides/slide9.xml><?xml version="1.0" encoding="utf-8"?>
+<p:sld xmlns:a="http://schemas.openxmlformats.org/drawingml/2006/main" xmlns:r="http://schemas.openxmlformats.org/officeDocument/2006/relationships" xmlns:p="http://schemas.openxmlformats.org/presentationml/2006/main">
+  <p:cSld>
+    <p:spTree>
+      <p:nvGrpSpPr>
+        <p:cNvPr id="1" name=""/>
+        <p:cNvGrpSpPr/>
+        <p:nvPr/>
+      </p:nvGrpSpPr>
+      <p:grpSpPr>
+        <a:xfrm>
+          <a:off x="0" y="0"/>
+          <a:ext cx="0" cy="0"/>
+          <a:chOff x="0" y="0"/>
+          <a:chExt cx="0" cy="0"/>
+        </a:xfrm>
+      </p:grpSpPr>
+      <p:sp>
+        <p:nvSpPr>
+          <p:cNvPr id="4" name="Content Placeholder 2"/>
+          <p:cNvSpPr>
+            <a:spLocks noGrp="1"/>
+          </p:cNvSpPr>
+          <p:nvPr>
+            <p:ph idx="1"/>
+          </p:nvPr>
+        </p:nvSpPr>
+        <p:spPr>
+          <a:xfrm>
+            <a:off x="457200" y="3124200"/>
+            <a:ext cx="8229600" cy="609600"/>
+          </a:xfrm>
+        </p:spPr>
+        <p:txBody>
+          <a:bodyPr anchor="t"/>
+          <a:lstStyle/>
+          <a:p>
+            <a:pPr marL="0" indent="0" algn="ctr">
+              <a:buNone/>
+            </a:pPr>
+            <a:r>
+              <a:rPr lang="en-US" dirty="0" smtClean="0"/>
+              <a:t>Filtering unknown messages</a:t>
+            </a:r>
+            <a:endParaRPr lang="en-US" dirty="0"/>
+          </a:p>
+        </p:txBody>
+      </p:sp>
+    </p:spTree>
+    <p:extLst>
+      <p:ext uri="{BB962C8B-B14F-4D97-AF65-F5344CB8AC3E}">
+        <p14:creationId xmlns:p14="http://schemas.microsoft.com/office/powerpoint/2010/main" val="2335944705"/>
       </p:ext>
     </p:extLst>
   </p:cSld>

</xml_diff>